<commit_message>
Update week 0 materials.
</commit_message>
<xml_diff>
--- a/Lectures/Week 0/0. General Information.pptx
+++ b/Lectures/Week 0/0. General Information.pptx
@@ -12,15 +12,16 @@
     <p:sldId id="269" r:id="rId6"/>
     <p:sldId id="270" r:id="rId7"/>
     <p:sldId id="271" r:id="rId8"/>
-    <p:sldId id="272" r:id="rId9"/>
-    <p:sldId id="273" r:id="rId10"/>
-    <p:sldId id="265" r:id="rId11"/>
-    <p:sldId id="274" r:id="rId12"/>
-    <p:sldId id="275" r:id="rId13"/>
-    <p:sldId id="276" r:id="rId14"/>
-    <p:sldId id="277" r:id="rId15"/>
-    <p:sldId id="279" r:id="rId16"/>
-    <p:sldId id="278" r:id="rId17"/>
+    <p:sldId id="280" r:id="rId9"/>
+    <p:sldId id="272" r:id="rId10"/>
+    <p:sldId id="273" r:id="rId11"/>
+    <p:sldId id="265" r:id="rId12"/>
+    <p:sldId id="274" r:id="rId13"/>
+    <p:sldId id="275" r:id="rId14"/>
+    <p:sldId id="276" r:id="rId15"/>
+    <p:sldId id="277" r:id="rId16"/>
+    <p:sldId id="279" r:id="rId17"/>
+    <p:sldId id="278" r:id="rId18"/>
   </p:sldIdLst>
   <p:sldSz cx="12192000" cy="6858000"/>
   <p:notesSz cx="6858000" cy="9144000"/>
@@ -273,7 +274,7 @@
           <a:lstStyle/>
           <a:p>
             <a:fld id="{5A16CCFD-ABC4-514A-ACED-AF374D0AF7A0}" type="datetimeFigureOut">
-              <a:t>9/14/20</a:t>
+              <a:t>9/15/20</a:t>
             </a:fld>
             <a:endParaRPr lang="en-US"/>
           </a:p>
@@ -469,7 +470,7 @@
           <a:lstStyle/>
           <a:p>
             <a:fld id="{5A16CCFD-ABC4-514A-ACED-AF374D0AF7A0}" type="datetimeFigureOut">
-              <a:t>9/14/20</a:t>
+              <a:t>9/15/20</a:t>
             </a:fld>
             <a:endParaRPr lang="en-US"/>
           </a:p>
@@ -675,7 +676,7 @@
           <a:lstStyle/>
           <a:p>
             <a:fld id="{5A16CCFD-ABC4-514A-ACED-AF374D0AF7A0}" type="datetimeFigureOut">
-              <a:t>9/14/20</a:t>
+              <a:t>9/15/20</a:t>
             </a:fld>
             <a:endParaRPr lang="en-US"/>
           </a:p>
@@ -871,7 +872,7 @@
           <a:lstStyle/>
           <a:p>
             <a:fld id="{5A16CCFD-ABC4-514A-ACED-AF374D0AF7A0}" type="datetimeFigureOut">
-              <a:t>9/14/20</a:t>
+              <a:t>9/15/20</a:t>
             </a:fld>
             <a:endParaRPr lang="en-US"/>
           </a:p>
@@ -1144,7 +1145,7 @@
           <a:lstStyle/>
           <a:p>
             <a:fld id="{5A16CCFD-ABC4-514A-ACED-AF374D0AF7A0}" type="datetimeFigureOut">
-              <a:t>9/14/20</a:t>
+              <a:t>9/15/20</a:t>
             </a:fld>
             <a:endParaRPr lang="en-US"/>
           </a:p>
@@ -1407,7 +1408,7 @@
           <a:lstStyle/>
           <a:p>
             <a:fld id="{5A16CCFD-ABC4-514A-ACED-AF374D0AF7A0}" type="datetimeFigureOut">
-              <a:t>9/14/20</a:t>
+              <a:t>9/15/20</a:t>
             </a:fld>
             <a:endParaRPr lang="en-US"/>
           </a:p>
@@ -1817,7 +1818,7 @@
           <a:lstStyle/>
           <a:p>
             <a:fld id="{5A16CCFD-ABC4-514A-ACED-AF374D0AF7A0}" type="datetimeFigureOut">
-              <a:t>9/14/20</a:t>
+              <a:t>9/15/20</a:t>
             </a:fld>
             <a:endParaRPr lang="en-US"/>
           </a:p>
@@ -1956,7 +1957,7 @@
           <a:lstStyle/>
           <a:p>
             <a:fld id="{5A16CCFD-ABC4-514A-ACED-AF374D0AF7A0}" type="datetimeFigureOut">
-              <a:t>9/14/20</a:t>
+              <a:t>9/15/20</a:t>
             </a:fld>
             <a:endParaRPr lang="en-US"/>
           </a:p>
@@ -2067,7 +2068,7 @@
           <a:lstStyle/>
           <a:p>
             <a:fld id="{5A16CCFD-ABC4-514A-ACED-AF374D0AF7A0}" type="datetimeFigureOut">
-              <a:t>9/14/20</a:t>
+              <a:t>9/15/20</a:t>
             </a:fld>
             <a:endParaRPr lang="en-US"/>
           </a:p>
@@ -2376,7 +2377,7 @@
           <a:lstStyle/>
           <a:p>
             <a:fld id="{5A16CCFD-ABC4-514A-ACED-AF374D0AF7A0}" type="datetimeFigureOut">
-              <a:t>9/14/20</a:t>
+              <a:t>9/15/20</a:t>
             </a:fld>
             <a:endParaRPr lang="en-US"/>
           </a:p>
@@ -2662,7 +2663,7 @@
           <a:lstStyle/>
           <a:p>
             <a:fld id="{5A16CCFD-ABC4-514A-ACED-AF374D0AF7A0}" type="datetimeFigureOut">
-              <a:t>9/14/20</a:t>
+              <a:t>9/15/20</a:t>
             </a:fld>
             <a:endParaRPr lang="en-US"/>
           </a:p>
@@ -2901,7 +2902,7 @@
           </a:lstStyle>
           <a:p>
             <a:fld id="{5A16CCFD-ABC4-514A-ACED-AF374D0AF7A0}" type="datetimeFigureOut">
-              <a:t>9/14/20</a:t>
+              <a:t>9/15/20</a:t>
             </a:fld>
             <a:endParaRPr lang="en-US"/>
           </a:p>
@@ -3417,6 +3418,589 @@
 </file>
 
 <file path=ppt/slides/slide10.xml><?xml version="1.0" encoding="utf-8"?>
+<p:sld xmlns:a="http://schemas.openxmlformats.org/drawingml/2006/main" xmlns:r="http://schemas.openxmlformats.org/officeDocument/2006/relationships" xmlns:p="http://schemas.openxmlformats.org/presentationml/2006/main">
+  <p:cSld>
+    <p:spTree>
+      <p:nvGrpSpPr>
+        <p:cNvPr id="1" name=""/>
+        <p:cNvGrpSpPr/>
+        <p:nvPr/>
+      </p:nvGrpSpPr>
+      <p:grpSpPr>
+        <a:xfrm>
+          <a:off x="0" y="0"/>
+          <a:ext cx="0" cy="0"/>
+          <a:chOff x="0" y="0"/>
+          <a:chExt cx="0" cy="0"/>
+        </a:xfrm>
+      </p:grpSpPr>
+      <p:sp>
+        <p:nvSpPr>
+          <p:cNvPr id="2" name="Title 1">
+            <a:extLst>
+              <a:ext uri="{FF2B5EF4-FFF2-40B4-BE49-F238E27FC236}">
+                <a16:creationId xmlns:a16="http://schemas.microsoft.com/office/drawing/2014/main" id="{A2F38300-EC12-5E4B-AAF1-1C617CF70063}"/>
+              </a:ext>
+            </a:extLst>
+          </p:cNvPr>
+          <p:cNvSpPr>
+            <a:spLocks noGrp="1"/>
+          </p:cNvSpPr>
+          <p:nvPr>
+            <p:ph type="title"/>
+          </p:nvPr>
+        </p:nvSpPr>
+        <p:spPr/>
+        <p:txBody>
+          <a:bodyPr/>
+          <a:lstStyle/>
+          <a:p>
+            <a:r>
+              <a:rPr lang="en-US"/>
+              <a:t>Asking Questions</a:t>
+            </a:r>
+          </a:p>
+        </p:txBody>
+      </p:sp>
+      <p:sp>
+        <p:nvSpPr>
+          <p:cNvPr id="3" name="Content Placeholder 2">
+            <a:extLst>
+              <a:ext uri="{FF2B5EF4-FFF2-40B4-BE49-F238E27FC236}">
+                <a16:creationId xmlns:a16="http://schemas.microsoft.com/office/drawing/2014/main" id="{CEA3B914-BC1D-E242-B553-A73400FC4178}"/>
+              </a:ext>
+            </a:extLst>
+          </p:cNvPr>
+          <p:cNvSpPr>
+            <a:spLocks noGrp="1"/>
+          </p:cNvSpPr>
+          <p:nvPr>
+            <p:ph idx="1"/>
+          </p:nvPr>
+        </p:nvSpPr>
+        <p:spPr/>
+        <p:txBody>
+          <a:bodyPr/>
+          <a:lstStyle/>
+          <a:p>
+            <a:pPr marL="0" indent="0">
+              <a:buNone/>
+            </a:pPr>
+            <a:r>
+              <a:rPr lang="en-US"/>
+              <a:t>You have 4 channels to ask questions</a:t>
+            </a:r>
+          </a:p>
+          <a:p>
+            <a:endParaRPr lang="en-US"/>
+          </a:p>
+        </p:txBody>
+      </p:sp>
+      <p:graphicFrame>
+        <p:nvGraphicFramePr>
+          <p:cNvPr id="4" name="Table 3">
+            <a:extLst>
+              <a:ext uri="{FF2B5EF4-FFF2-40B4-BE49-F238E27FC236}">
+                <a16:creationId xmlns:a16="http://schemas.microsoft.com/office/drawing/2014/main" id="{E6062EDC-736D-0047-9EC8-CA2D47E27289}"/>
+              </a:ext>
+            </a:extLst>
+          </p:cNvPr>
+          <p:cNvGraphicFramePr>
+            <a:graphicFrameLocks noGrp="1"/>
+          </p:cNvGraphicFramePr>
+          <p:nvPr>
+            <p:extLst>
+              <p:ext uri="{D42A27DB-BD31-4B8C-83A1-F6EECF244321}">
+                <p14:modId xmlns:p14="http://schemas.microsoft.com/office/powerpoint/2010/main" val="2474538415"/>
+              </p:ext>
+            </p:extLst>
+          </p:nvPr>
+        </p:nvGraphicFramePr>
+        <p:xfrm>
+          <a:off x="1244600" y="2715957"/>
+          <a:ext cx="9918700" cy="2392680"/>
+        </p:xfrm>
+        <a:graphic>
+          <a:graphicData uri="http://schemas.openxmlformats.org/drawingml/2006/table">
+            <a:tbl>
+              <a:tblPr firstRow="1" bandRow="1">
+                <a:tableStyleId>{5C22544A-7EE6-4342-B048-85BDC9FD1C3A}</a:tableStyleId>
+              </a:tblPr>
+              <a:tblGrid>
+                <a:gridCol w="1983740">
+                  <a:extLst>
+                    <a:ext uri="{9D8B030D-6E8A-4147-A177-3AD203B41FA5}">
+                      <a16:colId xmlns:a16="http://schemas.microsoft.com/office/drawing/2014/main" val="1943112452"/>
+                    </a:ext>
+                  </a:extLst>
+                </a:gridCol>
+                <a:gridCol w="1983740">
+                  <a:extLst>
+                    <a:ext uri="{9D8B030D-6E8A-4147-A177-3AD203B41FA5}">
+                      <a16:colId xmlns:a16="http://schemas.microsoft.com/office/drawing/2014/main" val="3938429733"/>
+                    </a:ext>
+                  </a:extLst>
+                </a:gridCol>
+                <a:gridCol w="1983740">
+                  <a:extLst>
+                    <a:ext uri="{9D8B030D-6E8A-4147-A177-3AD203B41FA5}">
+                      <a16:colId xmlns:a16="http://schemas.microsoft.com/office/drawing/2014/main" val="2416875914"/>
+                    </a:ext>
+                  </a:extLst>
+                </a:gridCol>
+                <a:gridCol w="1983740">
+                  <a:extLst>
+                    <a:ext uri="{9D8B030D-6E8A-4147-A177-3AD203B41FA5}">
+                      <a16:colId xmlns:a16="http://schemas.microsoft.com/office/drawing/2014/main" val="2984967369"/>
+                    </a:ext>
+                  </a:extLst>
+                </a:gridCol>
+                <a:gridCol w="1983740">
+                  <a:extLst>
+                    <a:ext uri="{9D8B030D-6E8A-4147-A177-3AD203B41FA5}">
+                      <a16:colId xmlns:a16="http://schemas.microsoft.com/office/drawing/2014/main" val="3848360245"/>
+                    </a:ext>
+                  </a:extLst>
+                </a:gridCol>
+              </a:tblGrid>
+              <a:tr h="370840">
+                <a:tc>
+                  <a:txBody>
+                    <a:bodyPr/>
+                    <a:lstStyle/>
+                    <a:p>
+                      <a:r>
+                        <a:rPr lang="en-US"/>
+                        <a:t>Platform</a:t>
+                      </a:r>
+                    </a:p>
+                  </a:txBody>
+                  <a:tcPr/>
+                </a:tc>
+                <a:tc>
+                  <a:txBody>
+                    <a:bodyPr/>
+                    <a:lstStyle/>
+                    <a:p>
+                      <a:r>
+                        <a:rPr lang="en-US"/>
+                        <a:t>modality</a:t>
+                      </a:r>
+                    </a:p>
+                  </a:txBody>
+                  <a:tcPr/>
+                </a:tc>
+                <a:tc>
+                  <a:txBody>
+                    <a:bodyPr/>
+                    <a:lstStyle/>
+                    <a:p>
+                      <a:r>
+                        <a:rPr lang="en-US"/>
+                        <a:t>when</a:t>
+                      </a:r>
+                    </a:p>
+                  </a:txBody>
+                  <a:tcPr/>
+                </a:tc>
+                <a:tc>
+                  <a:txBody>
+                    <a:bodyPr/>
+                    <a:lstStyle/>
+                    <a:p>
+                      <a:r>
+                        <a:rPr lang="en-US"/>
+                        <a:t>answered</a:t>
+                      </a:r>
+                    </a:p>
+                  </a:txBody>
+                  <a:tcPr/>
+                </a:tc>
+                <a:tc>
+                  <a:txBody>
+                    <a:bodyPr/>
+                    <a:lstStyle/>
+                    <a:p>
+                      <a:r>
+                        <a:rPr lang="en-US"/>
+                        <a:t>visibility</a:t>
+                      </a:r>
+                    </a:p>
+                  </a:txBody>
+                  <a:tcPr/>
+                </a:tc>
+                <a:extLst>
+                  <a:ext uri="{0D108BD9-81ED-4DB2-BD59-A6C34878D82A}">
+                    <a16:rowId xmlns:a16="http://schemas.microsoft.com/office/drawing/2014/main" val="3403969237"/>
+                  </a:ext>
+                </a:extLst>
+              </a:tr>
+              <a:tr h="370840">
+                <a:tc>
+                  <a:txBody>
+                    <a:bodyPr/>
+                    <a:lstStyle/>
+                    <a:p>
+                      <a:r>
+                        <a:rPr lang="en-US" dirty="0"/>
+                        <a:t>Moodle</a:t>
+                      </a:r>
+                    </a:p>
+                  </a:txBody>
+                  <a:tcPr/>
+                </a:tc>
+                <a:tc>
+                  <a:txBody>
+                    <a:bodyPr/>
+                    <a:lstStyle/>
+                    <a:p>
+                      <a:r>
+                        <a:rPr lang="en-US" dirty="0"/>
+                        <a:t>offline</a:t>
+                      </a:r>
+                    </a:p>
+                  </a:txBody>
+                  <a:tcPr/>
+                </a:tc>
+                <a:tc>
+                  <a:txBody>
+                    <a:bodyPr/>
+                    <a:lstStyle/>
+                    <a:p>
+                      <a:r>
+                        <a:rPr lang="en-US"/>
+                        <a:t>After studying</a:t>
+                      </a:r>
+                    </a:p>
+                  </a:txBody>
+                  <a:tcPr/>
+                </a:tc>
+                <a:tc>
+                  <a:txBody>
+                    <a:bodyPr/>
+                    <a:lstStyle/>
+                    <a:p>
+                      <a:r>
+                        <a:rPr lang="en-US"/>
+                        <a:t>Tuesday session</a:t>
+                      </a:r>
+                    </a:p>
+                  </a:txBody>
+                  <a:tcPr/>
+                </a:tc>
+                <a:tc>
+                  <a:txBody>
+                    <a:bodyPr/>
+                    <a:lstStyle/>
+                    <a:p>
+                      <a:r>
+                        <a:rPr lang="en-US" dirty="0"/>
+                        <a:t>public</a:t>
+                      </a:r>
+                    </a:p>
+                  </a:txBody>
+                  <a:tcPr/>
+                </a:tc>
+                <a:extLst>
+                  <a:ext uri="{0D108BD9-81ED-4DB2-BD59-A6C34878D82A}">
+                    <a16:rowId xmlns:a16="http://schemas.microsoft.com/office/drawing/2014/main" val="3275686737"/>
+                  </a:ext>
+                </a:extLst>
+              </a:tr>
+              <a:tr h="370840">
+                <a:tc>
+                  <a:txBody>
+                    <a:bodyPr/>
+                    <a:lstStyle/>
+                    <a:p>
+                      <a:r>
+                        <a:rPr lang="en-US" dirty="0"/>
+                        <a:t>Zoom chat</a:t>
+                      </a:r>
+                    </a:p>
+                  </a:txBody>
+                  <a:tcPr/>
+                </a:tc>
+                <a:tc>
+                  <a:txBody>
+                    <a:bodyPr/>
+                    <a:lstStyle/>
+                    <a:p>
+                      <a:r>
+                        <a:rPr lang="en-US" dirty="0"/>
+                        <a:t>online</a:t>
+                      </a:r>
+                    </a:p>
+                  </a:txBody>
+                  <a:tcPr/>
+                </a:tc>
+                <a:tc>
+                  <a:txBody>
+                    <a:bodyPr/>
+                    <a:lstStyle/>
+                    <a:p>
+                      <a:r>
+                        <a:rPr lang="en-US" dirty="0"/>
+                        <a:t>During online class</a:t>
+                      </a:r>
+                    </a:p>
+                  </a:txBody>
+                  <a:tcPr/>
+                </a:tc>
+                <a:tc>
+                  <a:txBody>
+                    <a:bodyPr/>
+                    <a:lstStyle/>
+                    <a:p>
+                      <a:pPr marL="0" marR="0" lvl="0" indent="0" algn="l" defTabSz="914400" rtl="0" eaLnBrk="1" fontAlgn="auto" latinLnBrk="0" hangingPunct="1">
+                        <a:lnSpc>
+                          <a:spcPct val="100000"/>
+                        </a:lnSpc>
+                        <a:spcBef>
+                          <a:spcPts val="0"/>
+                        </a:spcBef>
+                        <a:spcAft>
+                          <a:spcPts val="0"/>
+                        </a:spcAft>
+                        <a:buClrTx/>
+                        <a:buSzTx/>
+                        <a:buFontTx/>
+                        <a:buNone/>
+                        <a:tabLst/>
+                        <a:defRPr/>
+                      </a:pPr>
+                      <a:r>
+                        <a:rPr lang="en-US" dirty="0"/>
+                        <a:t>Tuesday session</a:t>
+                      </a:r>
+                    </a:p>
+                    <a:p>
+                      <a:endParaRPr lang="en-US" dirty="0"/>
+                    </a:p>
+                  </a:txBody>
+                  <a:tcPr/>
+                </a:tc>
+                <a:tc>
+                  <a:txBody>
+                    <a:bodyPr/>
+                    <a:lstStyle/>
+                    <a:p>
+                      <a:r>
+                        <a:rPr lang="en-US" dirty="0"/>
+                        <a:t>public</a:t>
+                      </a:r>
+                    </a:p>
+                  </a:txBody>
+                  <a:tcPr/>
+                </a:tc>
+                <a:extLst>
+                  <a:ext uri="{0D108BD9-81ED-4DB2-BD59-A6C34878D82A}">
+                    <a16:rowId xmlns:a16="http://schemas.microsoft.com/office/drawing/2014/main" val="2251169270"/>
+                  </a:ext>
+                </a:extLst>
+              </a:tr>
+              <a:tr h="370840">
+                <a:tc>
+                  <a:txBody>
+                    <a:bodyPr/>
+                    <a:lstStyle/>
+                    <a:p>
+                      <a:r>
+                        <a:rPr lang="en-US" dirty="0"/>
+                        <a:t>Discord</a:t>
+                      </a:r>
+                    </a:p>
+                  </a:txBody>
+                  <a:tcPr/>
+                </a:tc>
+                <a:tc>
+                  <a:txBody>
+                    <a:bodyPr/>
+                    <a:lstStyle/>
+                    <a:p>
+                      <a:r>
+                        <a:rPr lang="en-US"/>
+                        <a:t>offline</a:t>
+                      </a:r>
+                    </a:p>
+                  </a:txBody>
+                  <a:tcPr/>
+                </a:tc>
+                <a:tc>
+                  <a:txBody>
+                    <a:bodyPr/>
+                    <a:lstStyle/>
+                    <a:p>
+                      <a:r>
+                        <a:rPr lang="en-US"/>
+                        <a:t>During the week</a:t>
+                      </a:r>
+                    </a:p>
+                  </a:txBody>
+                  <a:tcPr/>
+                </a:tc>
+                <a:tc>
+                  <a:txBody>
+                    <a:bodyPr/>
+                    <a:lstStyle/>
+                    <a:p>
+                      <a:r>
+                        <a:rPr lang="en-US"/>
+                        <a:t>Friday exercise</a:t>
+                      </a:r>
+                    </a:p>
+                  </a:txBody>
+                  <a:tcPr/>
+                </a:tc>
+                <a:tc>
+                  <a:txBody>
+                    <a:bodyPr/>
+                    <a:lstStyle/>
+                    <a:p>
+                      <a:r>
+                        <a:rPr lang="en-US" dirty="0"/>
+                        <a:t>Public or private</a:t>
+                      </a:r>
+                    </a:p>
+                  </a:txBody>
+                  <a:tcPr/>
+                </a:tc>
+                <a:extLst>
+                  <a:ext uri="{0D108BD9-81ED-4DB2-BD59-A6C34878D82A}">
+                    <a16:rowId xmlns:a16="http://schemas.microsoft.com/office/drawing/2014/main" val="2767651006"/>
+                  </a:ext>
+                </a:extLst>
+              </a:tr>
+              <a:tr h="370840">
+                <a:tc>
+                  <a:txBody>
+                    <a:bodyPr/>
+                    <a:lstStyle/>
+                    <a:p>
+                      <a:r>
+                        <a:rPr lang="en-US" dirty="0"/>
+                        <a:t>Discord</a:t>
+                      </a:r>
+                    </a:p>
+                  </a:txBody>
+                  <a:tcPr/>
+                </a:tc>
+                <a:tc>
+                  <a:txBody>
+                    <a:bodyPr/>
+                    <a:lstStyle/>
+                    <a:p>
+                      <a:r>
+                        <a:rPr lang="en-US" dirty="0"/>
+                        <a:t>online</a:t>
+                      </a:r>
+                    </a:p>
+                  </a:txBody>
+                  <a:tcPr/>
+                </a:tc>
+                <a:tc>
+                  <a:txBody>
+                    <a:bodyPr/>
+                    <a:lstStyle/>
+                    <a:p>
+                      <a:r>
+                        <a:rPr lang="en-US" dirty="0"/>
+                        <a:t>During Friday exercise</a:t>
+                      </a:r>
+                    </a:p>
+                  </a:txBody>
+                  <a:tcPr/>
+                </a:tc>
+                <a:tc>
+                  <a:txBody>
+                    <a:bodyPr/>
+                    <a:lstStyle/>
+                    <a:p>
+                      <a:pPr marL="0" marR="0" lvl="0" indent="0" algn="l" defTabSz="914400" rtl="0" eaLnBrk="1" fontAlgn="auto" latinLnBrk="0" hangingPunct="1">
+                        <a:lnSpc>
+                          <a:spcPct val="100000"/>
+                        </a:lnSpc>
+                        <a:spcBef>
+                          <a:spcPts val="0"/>
+                        </a:spcBef>
+                        <a:spcAft>
+                          <a:spcPts val="0"/>
+                        </a:spcAft>
+                        <a:buClrTx/>
+                        <a:buSzTx/>
+                        <a:buFontTx/>
+                        <a:buNone/>
+                        <a:tabLst/>
+                        <a:defRPr/>
+                      </a:pPr>
+                      <a:r>
+                        <a:rPr lang="en-US" dirty="0"/>
+                        <a:t>Friday exercise</a:t>
+                      </a:r>
+                    </a:p>
+                    <a:p>
+                      <a:endParaRPr lang="en-US" dirty="0"/>
+                    </a:p>
+                  </a:txBody>
+                  <a:tcPr/>
+                </a:tc>
+                <a:tc>
+                  <a:txBody>
+                    <a:bodyPr/>
+                    <a:lstStyle/>
+                    <a:p>
+                      <a:pPr marL="0" marR="0" lvl="0" indent="0" algn="l" defTabSz="914400" rtl="0" eaLnBrk="1" fontAlgn="auto" latinLnBrk="0" hangingPunct="1">
+                        <a:lnSpc>
+                          <a:spcPct val="100000"/>
+                        </a:lnSpc>
+                        <a:spcBef>
+                          <a:spcPts val="0"/>
+                        </a:spcBef>
+                        <a:spcAft>
+                          <a:spcPts val="0"/>
+                        </a:spcAft>
+                        <a:buClrTx/>
+                        <a:buSzTx/>
+                        <a:buFontTx/>
+                        <a:buNone/>
+                        <a:tabLst/>
+                        <a:defRPr/>
+                      </a:pPr>
+                      <a:r>
+                        <a:rPr lang="en-US" dirty="0"/>
+                        <a:t>Public or private</a:t>
+                      </a:r>
+                    </a:p>
+                    <a:p>
+                      <a:endParaRPr lang="en-US" dirty="0"/>
+                    </a:p>
+                  </a:txBody>
+                  <a:tcPr/>
+                </a:tc>
+                <a:extLst>
+                  <a:ext uri="{0D108BD9-81ED-4DB2-BD59-A6C34878D82A}">
+                    <a16:rowId xmlns:a16="http://schemas.microsoft.com/office/drawing/2014/main" val="2142359889"/>
+                  </a:ext>
+                </a:extLst>
+              </a:tr>
+            </a:tbl>
+          </a:graphicData>
+        </a:graphic>
+      </p:graphicFrame>
+    </p:spTree>
+    <p:extLst>
+      <p:ext uri="{BB962C8B-B14F-4D97-AF65-F5344CB8AC3E}">
+        <p14:creationId xmlns:p14="http://schemas.microsoft.com/office/powerpoint/2010/main" val="724816618"/>
+      </p:ext>
+    </p:extLst>
+  </p:cSld>
+  <p:clrMapOvr>
+    <a:masterClrMapping/>
+  </p:clrMapOvr>
+</p:sld>
+</file>
+
+<file path=ppt/slides/slide11.xml><?xml version="1.0" encoding="utf-8"?>
 <p:sld xmlns:a="http://schemas.openxmlformats.org/drawingml/2006/main" xmlns:r="http://schemas.openxmlformats.org/officeDocument/2006/relationships" xmlns:p="http://schemas.openxmlformats.org/presentationml/2006/main">
   <p:cSld>
     <p:spTree>
@@ -4214,128 +4798,6 @@
 </p:sld>
 </file>
 
-<file path=ppt/slides/slide11.xml><?xml version="1.0" encoding="utf-8"?>
-<p:sld xmlns:a="http://schemas.openxmlformats.org/drawingml/2006/main" xmlns:r="http://schemas.openxmlformats.org/officeDocument/2006/relationships" xmlns:p="http://schemas.openxmlformats.org/presentationml/2006/main">
-  <p:cSld>
-    <p:spTree>
-      <p:nvGrpSpPr>
-        <p:cNvPr id="1" name=""/>
-        <p:cNvGrpSpPr/>
-        <p:nvPr/>
-      </p:nvGrpSpPr>
-      <p:grpSpPr>
-        <a:xfrm>
-          <a:off x="0" y="0"/>
-          <a:ext cx="0" cy="0"/>
-          <a:chOff x="0" y="0"/>
-          <a:chExt cx="0" cy="0"/>
-        </a:xfrm>
-      </p:grpSpPr>
-      <p:sp>
-        <p:nvSpPr>
-          <p:cNvPr id="2" name="Title 1">
-            <a:extLst>
-              <a:ext uri="{FF2B5EF4-FFF2-40B4-BE49-F238E27FC236}">
-                <a16:creationId xmlns:a16="http://schemas.microsoft.com/office/drawing/2014/main" id="{379CB468-F879-2048-ABB2-BBF0EFC39EFE}"/>
-              </a:ext>
-            </a:extLst>
-          </p:cNvPr>
-          <p:cNvSpPr>
-            <a:spLocks noGrp="1"/>
-          </p:cNvSpPr>
-          <p:nvPr>
-            <p:ph type="title"/>
-          </p:nvPr>
-        </p:nvSpPr>
-        <p:spPr/>
-        <p:txBody>
-          <a:bodyPr/>
-          <a:lstStyle/>
-          <a:p>
-            <a:r>
-              <a:rPr lang="en-US"/>
-              <a:t>Exam</a:t>
-            </a:r>
-          </a:p>
-        </p:txBody>
-      </p:sp>
-      <p:sp>
-        <p:nvSpPr>
-          <p:cNvPr id="3" name="Content Placeholder 2">
-            <a:extLst>
-              <a:ext uri="{FF2B5EF4-FFF2-40B4-BE49-F238E27FC236}">
-                <a16:creationId xmlns:a16="http://schemas.microsoft.com/office/drawing/2014/main" id="{44E855A5-83CF-E540-BD6A-029F5480BAFA}"/>
-              </a:ext>
-            </a:extLst>
-          </p:cNvPr>
-          <p:cNvSpPr>
-            <a:spLocks noGrp="1"/>
-          </p:cNvSpPr>
-          <p:nvPr>
-            <p:ph idx="1"/>
-          </p:nvPr>
-        </p:nvSpPr>
-        <p:spPr/>
-        <p:txBody>
-          <a:bodyPr>
-            <a:normAutofit/>
-          </a:bodyPr>
-          <a:lstStyle/>
-          <a:p>
-            <a:r>
-              <a:rPr lang="en-GB"/>
-              <a:t>There will be one exam (the final exam)</a:t>
-            </a:r>
-          </a:p>
-          <a:p>
-            <a:r>
-              <a:rPr lang="en-GB"/>
-              <a:t>There will not be a midterm exam</a:t>
-            </a:r>
-          </a:p>
-          <a:p>
-            <a:r>
-              <a:rPr lang="en-GB"/>
-              <a:t>The final exam will be in both French and English.</a:t>
-            </a:r>
-          </a:p>
-          <a:p>
-            <a:r>
-              <a:rPr lang="en-GB"/>
-              <a:t> It will consist of 24 multiple choice questions on subjects treated during the semester. </a:t>
-            </a:r>
-          </a:p>
-          <a:p>
-            <a:r>
-              <a:rPr lang="en-GB"/>
-              <a:t>Per multiple choice question precisely one of the four answers is correct. </a:t>
-            </a:r>
-          </a:p>
-          <a:p>
-            <a:r>
-              <a:rPr lang="en-GB"/>
-              <a:t>Representative example questions will be made available. </a:t>
-            </a:r>
-            <a:br>
-              <a:rPr lang="en-GB"/>
-            </a:br>
-            <a:endParaRPr lang="en-US"/>
-          </a:p>
-        </p:txBody>
-      </p:sp>
-    </p:spTree>
-    <p:extLst>
-      <p:ext uri="{BB962C8B-B14F-4D97-AF65-F5344CB8AC3E}">
-        <p14:creationId xmlns:p14="http://schemas.microsoft.com/office/powerpoint/2010/main" val="3169043201"/>
-      </p:ext>
-    </p:extLst>
-  </p:cSld>
-  <p:clrMapOvr>
-    <a:masterClrMapping/>
-  </p:clrMapOvr>
-</p:sld>
-</file>
-
 <file path=ppt/slides/slide12.xml><?xml version="1.0" encoding="utf-8"?>
 <p:sld xmlns:a="http://schemas.openxmlformats.org/drawingml/2006/main" xmlns:r="http://schemas.openxmlformats.org/officeDocument/2006/relationships" xmlns:p="http://schemas.openxmlformats.org/presentationml/2006/main">
   <p:cSld>
@@ -4358,7 +4820,7 @@
           <p:cNvPr id="2" name="Title 1">
             <a:extLst>
               <a:ext uri="{FF2B5EF4-FFF2-40B4-BE49-F238E27FC236}">
-                <a16:creationId xmlns:a16="http://schemas.microsoft.com/office/drawing/2014/main" id="{837D0052-156F-5548-8E15-54929D0BD281}"/>
+                <a16:creationId xmlns:a16="http://schemas.microsoft.com/office/drawing/2014/main" id="{379CB468-F879-2048-ABB2-BBF0EFC39EFE}"/>
               </a:ext>
             </a:extLst>
           </p:cNvPr>
@@ -4376,7 +4838,7 @@
           <a:p>
             <a:r>
               <a:rPr lang="en-US"/>
-              <a:t>Grading</a:t>
+              <a:t>Exam</a:t>
             </a:r>
           </a:p>
         </p:txBody>
@@ -4386,7 +4848,7 @@
           <p:cNvPr id="3" name="Content Placeholder 2">
             <a:extLst>
               <a:ext uri="{FF2B5EF4-FFF2-40B4-BE49-F238E27FC236}">
-                <a16:creationId xmlns:a16="http://schemas.microsoft.com/office/drawing/2014/main" id="{16A3B9C7-8B8D-8B41-8E86-62E032CB899A}"/>
+                <a16:creationId xmlns:a16="http://schemas.microsoft.com/office/drawing/2014/main" id="{44E855A5-83CF-E540-BD6A-029F5480BAFA}"/>
               </a:ext>
             </a:extLst>
           </p:cNvPr>
@@ -4399,39 +4861,389 @@
         </p:nvSpPr>
         <p:spPr/>
         <p:txBody>
-          <a:bodyPr/>
+          <a:bodyPr>
+            <a:normAutofit/>
+          </a:bodyPr>
           <a:lstStyle/>
           <a:p>
             <a:r>
-              <a:rPr lang="en-GB"/>
-              <a:t>The grade is calculated based on the number of questions for which only the correct answer is ticked. </a:t>
-            </a:r>
-          </a:p>
-          <a:p>
-            <a:r>
-              <a:rPr lang="en-GB"/>
-              <a:t>There is no penalty for incorrectly answering a question (i.e., ticking a wrong answer, or ticking multiple answers), so on average guessing is more advantageous than not answering a question at all (i.e., not ticking any of the four answers). </a:t>
-            </a:r>
-          </a:p>
-          <a:p>
-            <a:r>
-              <a:rPr lang="en-GB"/>
-              <a:t>It greatly helps a fast grading process if you follow the instructions given on the cover sheet of your final exam.</a:t>
-            </a:r>
-            <a:endParaRPr lang="en-US"/>
+              <a:rPr lang="en-GB" dirty="0"/>
+              <a:t>There will be one exam (the final exam)</a:t>
+            </a:r>
+          </a:p>
+          <a:p>
+            <a:r>
+              <a:rPr lang="en-GB" dirty="0"/>
+              <a:t>There will not be a midterm exam</a:t>
+            </a:r>
+          </a:p>
+          <a:p>
+            <a:r>
+              <a:rPr lang="en-GB" dirty="0"/>
+              <a:t>The final exam will be in both French and English.</a:t>
+            </a:r>
+          </a:p>
+          <a:p>
+            <a:r>
+              <a:rPr lang="en-GB" dirty="0"/>
+              <a:t> It will consist of 24 multiple choice questions on subjects treated during the semester. </a:t>
+            </a:r>
+          </a:p>
+          <a:p>
+            <a:r>
+              <a:rPr lang="en-GB" dirty="0"/>
+              <a:t>Per multiple choice question precisely one of the four answers is correct. </a:t>
+            </a:r>
+          </a:p>
+          <a:p>
+            <a:r>
+              <a:rPr lang="en-GB" dirty="0"/>
+              <a:t>Representative example questions will be made available. </a:t>
+            </a:r>
+            <a:br>
+              <a:rPr lang="en-GB" dirty="0"/>
+            </a:br>
+            <a:endParaRPr lang="en-US" dirty="0"/>
           </a:p>
         </p:txBody>
       </p:sp>
     </p:spTree>
     <p:extLst>
       <p:ext uri="{BB962C8B-B14F-4D97-AF65-F5344CB8AC3E}">
-        <p14:creationId xmlns:p14="http://schemas.microsoft.com/office/powerpoint/2010/main" val="2679088927"/>
+        <p14:creationId xmlns:p14="http://schemas.microsoft.com/office/powerpoint/2010/main" val="3169043201"/>
       </p:ext>
     </p:extLst>
   </p:cSld>
   <p:clrMapOvr>
     <a:masterClrMapping/>
   </p:clrMapOvr>
+  <p:timing>
+    <p:tnLst>
+      <p:par>
+        <p:cTn id="1" dur="indefinite" restart="never" nodeType="tmRoot">
+          <p:childTnLst>
+            <p:seq concurrent="1" nextAc="seek">
+              <p:cTn id="2" dur="indefinite" nodeType="mainSeq">
+                <p:childTnLst>
+                  <p:par>
+                    <p:cTn id="3" fill="hold">
+                      <p:stCondLst>
+                        <p:cond delay="indefinite"/>
+                      </p:stCondLst>
+                      <p:childTnLst>
+                        <p:par>
+                          <p:cTn id="4" fill="hold">
+                            <p:stCondLst>
+                              <p:cond delay="0"/>
+                            </p:stCondLst>
+                            <p:childTnLst>
+                              <p:par>
+                                <p:cTn id="5" presetID="1" presetClass="entr" presetSubtype="0" fill="hold" grpId="0" nodeType="clickEffect">
+                                  <p:stCondLst>
+                                    <p:cond delay="0"/>
+                                  </p:stCondLst>
+                                  <p:childTnLst>
+                                    <p:set>
+                                      <p:cBhvr>
+                                        <p:cTn id="6" dur="1" fill="hold">
+                                          <p:stCondLst>
+                                            <p:cond delay="0"/>
+                                          </p:stCondLst>
+                                        </p:cTn>
+                                        <p:tgtEl>
+                                          <p:spTgt spid="3">
+                                            <p:txEl>
+                                              <p:pRg st="0" end="0"/>
+                                            </p:txEl>
+                                          </p:spTgt>
+                                        </p:tgtEl>
+                                        <p:attrNameLst>
+                                          <p:attrName>style.visibility</p:attrName>
+                                        </p:attrNameLst>
+                                      </p:cBhvr>
+                                      <p:to>
+                                        <p:strVal val="visible"/>
+                                      </p:to>
+                                    </p:set>
+                                  </p:childTnLst>
+                                </p:cTn>
+                              </p:par>
+                            </p:childTnLst>
+                          </p:cTn>
+                        </p:par>
+                      </p:childTnLst>
+                    </p:cTn>
+                  </p:par>
+                  <p:par>
+                    <p:cTn id="7" fill="hold">
+                      <p:stCondLst>
+                        <p:cond delay="indefinite"/>
+                      </p:stCondLst>
+                      <p:childTnLst>
+                        <p:par>
+                          <p:cTn id="8" fill="hold">
+                            <p:stCondLst>
+                              <p:cond delay="0"/>
+                            </p:stCondLst>
+                            <p:childTnLst>
+                              <p:par>
+                                <p:cTn id="9" presetID="1" presetClass="entr" presetSubtype="0" fill="hold" grpId="0" nodeType="clickEffect">
+                                  <p:stCondLst>
+                                    <p:cond delay="0"/>
+                                  </p:stCondLst>
+                                  <p:childTnLst>
+                                    <p:set>
+                                      <p:cBhvr>
+                                        <p:cTn id="10" dur="1" fill="hold">
+                                          <p:stCondLst>
+                                            <p:cond delay="0"/>
+                                          </p:stCondLst>
+                                        </p:cTn>
+                                        <p:tgtEl>
+                                          <p:spTgt spid="3">
+                                            <p:txEl>
+                                              <p:pRg st="1" end="1"/>
+                                            </p:txEl>
+                                          </p:spTgt>
+                                        </p:tgtEl>
+                                        <p:attrNameLst>
+                                          <p:attrName>style.visibility</p:attrName>
+                                        </p:attrNameLst>
+                                      </p:cBhvr>
+                                      <p:to>
+                                        <p:strVal val="visible"/>
+                                      </p:to>
+                                    </p:set>
+                                  </p:childTnLst>
+                                </p:cTn>
+                              </p:par>
+                            </p:childTnLst>
+                          </p:cTn>
+                        </p:par>
+                      </p:childTnLst>
+                    </p:cTn>
+                  </p:par>
+                  <p:par>
+                    <p:cTn id="11" fill="hold">
+                      <p:stCondLst>
+                        <p:cond delay="indefinite"/>
+                      </p:stCondLst>
+                      <p:childTnLst>
+                        <p:par>
+                          <p:cTn id="12" fill="hold">
+                            <p:stCondLst>
+                              <p:cond delay="0"/>
+                            </p:stCondLst>
+                            <p:childTnLst>
+                              <p:par>
+                                <p:cTn id="13" presetID="1" presetClass="entr" presetSubtype="0" fill="hold" grpId="0" nodeType="clickEffect">
+                                  <p:stCondLst>
+                                    <p:cond delay="0"/>
+                                  </p:stCondLst>
+                                  <p:childTnLst>
+                                    <p:set>
+                                      <p:cBhvr>
+                                        <p:cTn id="14" dur="1" fill="hold">
+                                          <p:stCondLst>
+                                            <p:cond delay="0"/>
+                                          </p:stCondLst>
+                                        </p:cTn>
+                                        <p:tgtEl>
+                                          <p:spTgt spid="3">
+                                            <p:txEl>
+                                              <p:pRg st="2" end="2"/>
+                                            </p:txEl>
+                                          </p:spTgt>
+                                        </p:tgtEl>
+                                        <p:attrNameLst>
+                                          <p:attrName>style.visibility</p:attrName>
+                                        </p:attrNameLst>
+                                      </p:cBhvr>
+                                      <p:to>
+                                        <p:strVal val="visible"/>
+                                      </p:to>
+                                    </p:set>
+                                  </p:childTnLst>
+                                </p:cTn>
+                              </p:par>
+                            </p:childTnLst>
+                          </p:cTn>
+                        </p:par>
+                      </p:childTnLst>
+                    </p:cTn>
+                  </p:par>
+                  <p:par>
+                    <p:cTn id="15" fill="hold">
+                      <p:stCondLst>
+                        <p:cond delay="indefinite"/>
+                      </p:stCondLst>
+                      <p:childTnLst>
+                        <p:par>
+                          <p:cTn id="16" fill="hold">
+                            <p:stCondLst>
+                              <p:cond delay="0"/>
+                            </p:stCondLst>
+                            <p:childTnLst>
+                              <p:par>
+                                <p:cTn id="17" presetID="1" presetClass="entr" presetSubtype="0" fill="hold" grpId="0" nodeType="clickEffect">
+                                  <p:stCondLst>
+                                    <p:cond delay="0"/>
+                                  </p:stCondLst>
+                                  <p:childTnLst>
+                                    <p:set>
+                                      <p:cBhvr>
+                                        <p:cTn id="18" dur="1" fill="hold">
+                                          <p:stCondLst>
+                                            <p:cond delay="0"/>
+                                          </p:stCondLst>
+                                        </p:cTn>
+                                        <p:tgtEl>
+                                          <p:spTgt spid="3">
+                                            <p:txEl>
+                                              <p:pRg st="3" end="3"/>
+                                            </p:txEl>
+                                          </p:spTgt>
+                                        </p:tgtEl>
+                                        <p:attrNameLst>
+                                          <p:attrName>style.visibility</p:attrName>
+                                        </p:attrNameLst>
+                                      </p:cBhvr>
+                                      <p:to>
+                                        <p:strVal val="visible"/>
+                                      </p:to>
+                                    </p:set>
+                                  </p:childTnLst>
+                                </p:cTn>
+                              </p:par>
+                            </p:childTnLst>
+                          </p:cTn>
+                        </p:par>
+                      </p:childTnLst>
+                    </p:cTn>
+                  </p:par>
+                  <p:par>
+                    <p:cTn id="19" fill="hold">
+                      <p:stCondLst>
+                        <p:cond delay="indefinite"/>
+                      </p:stCondLst>
+                      <p:childTnLst>
+                        <p:par>
+                          <p:cTn id="20" fill="hold">
+                            <p:stCondLst>
+                              <p:cond delay="0"/>
+                            </p:stCondLst>
+                            <p:childTnLst>
+                              <p:par>
+                                <p:cTn id="21" presetID="1" presetClass="entr" presetSubtype="0" fill="hold" grpId="0" nodeType="clickEffect">
+                                  <p:stCondLst>
+                                    <p:cond delay="0"/>
+                                  </p:stCondLst>
+                                  <p:childTnLst>
+                                    <p:set>
+                                      <p:cBhvr>
+                                        <p:cTn id="22" dur="1" fill="hold">
+                                          <p:stCondLst>
+                                            <p:cond delay="0"/>
+                                          </p:stCondLst>
+                                        </p:cTn>
+                                        <p:tgtEl>
+                                          <p:spTgt spid="3">
+                                            <p:txEl>
+                                              <p:pRg st="4" end="4"/>
+                                            </p:txEl>
+                                          </p:spTgt>
+                                        </p:tgtEl>
+                                        <p:attrNameLst>
+                                          <p:attrName>style.visibility</p:attrName>
+                                        </p:attrNameLst>
+                                      </p:cBhvr>
+                                      <p:to>
+                                        <p:strVal val="visible"/>
+                                      </p:to>
+                                    </p:set>
+                                  </p:childTnLst>
+                                </p:cTn>
+                              </p:par>
+                            </p:childTnLst>
+                          </p:cTn>
+                        </p:par>
+                      </p:childTnLst>
+                    </p:cTn>
+                  </p:par>
+                  <p:par>
+                    <p:cTn id="23" fill="hold">
+                      <p:stCondLst>
+                        <p:cond delay="indefinite"/>
+                      </p:stCondLst>
+                      <p:childTnLst>
+                        <p:par>
+                          <p:cTn id="24" fill="hold">
+                            <p:stCondLst>
+                              <p:cond delay="0"/>
+                            </p:stCondLst>
+                            <p:childTnLst>
+                              <p:par>
+                                <p:cTn id="25" presetID="1" presetClass="entr" presetSubtype="0" fill="hold" grpId="0" nodeType="clickEffect">
+                                  <p:stCondLst>
+                                    <p:cond delay="0"/>
+                                  </p:stCondLst>
+                                  <p:childTnLst>
+                                    <p:set>
+                                      <p:cBhvr>
+                                        <p:cTn id="26" dur="1" fill="hold">
+                                          <p:stCondLst>
+                                            <p:cond delay="0"/>
+                                          </p:stCondLst>
+                                        </p:cTn>
+                                        <p:tgtEl>
+                                          <p:spTgt spid="3">
+                                            <p:txEl>
+                                              <p:pRg st="5" end="5"/>
+                                            </p:txEl>
+                                          </p:spTgt>
+                                        </p:tgtEl>
+                                        <p:attrNameLst>
+                                          <p:attrName>style.visibility</p:attrName>
+                                        </p:attrNameLst>
+                                      </p:cBhvr>
+                                      <p:to>
+                                        <p:strVal val="visible"/>
+                                      </p:to>
+                                    </p:set>
+                                  </p:childTnLst>
+                                </p:cTn>
+                              </p:par>
+                            </p:childTnLst>
+                          </p:cTn>
+                        </p:par>
+                      </p:childTnLst>
+                    </p:cTn>
+                  </p:par>
+                </p:childTnLst>
+              </p:cTn>
+              <p:prevCondLst>
+                <p:cond evt="onPrev" delay="0">
+                  <p:tgtEl>
+                    <p:sldTgt/>
+                  </p:tgtEl>
+                </p:cond>
+              </p:prevCondLst>
+              <p:nextCondLst>
+                <p:cond evt="onNext" delay="0">
+                  <p:tgtEl>
+                    <p:sldTgt/>
+                  </p:tgtEl>
+                </p:cond>
+              </p:nextCondLst>
+            </p:seq>
+          </p:childTnLst>
+        </p:cTn>
+      </p:par>
+    </p:tnLst>
+    <p:bldLst>
+      <p:bldP spid="3" grpId="0" build="p"/>
+    </p:bldLst>
+  </p:timing>
 </p:sld>
 </file>
 
@@ -4457,6 +5269,104 @@
           <p:cNvPr id="2" name="Title 1">
             <a:extLst>
               <a:ext uri="{FF2B5EF4-FFF2-40B4-BE49-F238E27FC236}">
+                <a16:creationId xmlns:a16="http://schemas.microsoft.com/office/drawing/2014/main" id="{837D0052-156F-5548-8E15-54929D0BD281}"/>
+              </a:ext>
+            </a:extLst>
+          </p:cNvPr>
+          <p:cNvSpPr>
+            <a:spLocks noGrp="1"/>
+          </p:cNvSpPr>
+          <p:nvPr>
+            <p:ph type="title"/>
+          </p:nvPr>
+        </p:nvSpPr>
+        <p:spPr/>
+        <p:txBody>
+          <a:bodyPr/>
+          <a:lstStyle/>
+          <a:p>
+            <a:r>
+              <a:rPr lang="en-US"/>
+              <a:t>Grading</a:t>
+            </a:r>
+          </a:p>
+        </p:txBody>
+      </p:sp>
+      <p:sp>
+        <p:nvSpPr>
+          <p:cNvPr id="3" name="Content Placeholder 2">
+            <a:extLst>
+              <a:ext uri="{FF2B5EF4-FFF2-40B4-BE49-F238E27FC236}">
+                <a16:creationId xmlns:a16="http://schemas.microsoft.com/office/drawing/2014/main" id="{16A3B9C7-8B8D-8B41-8E86-62E032CB899A}"/>
+              </a:ext>
+            </a:extLst>
+          </p:cNvPr>
+          <p:cNvSpPr>
+            <a:spLocks noGrp="1"/>
+          </p:cNvSpPr>
+          <p:nvPr>
+            <p:ph idx="1"/>
+          </p:nvPr>
+        </p:nvSpPr>
+        <p:spPr/>
+        <p:txBody>
+          <a:bodyPr/>
+          <a:lstStyle/>
+          <a:p>
+            <a:r>
+              <a:rPr lang="en-GB" dirty="0"/>
+              <a:t>The grade is calculated based on the number of questions for which only the correct answer is ticked. </a:t>
+            </a:r>
+          </a:p>
+          <a:p>
+            <a:r>
+              <a:rPr lang="en-GB" dirty="0"/>
+              <a:t>There is no penalty for incorrectly answering a question (i.e., ticking a wrong answer, or ticking multiple answers)</a:t>
+            </a:r>
+          </a:p>
+          <a:p>
+            <a:r>
+              <a:rPr lang="en-GB" dirty="0"/>
+              <a:t>so on average guessing is more advantageous than not answering a question at all (i.e., not ticking any of the four answers). </a:t>
+            </a:r>
+          </a:p>
+        </p:txBody>
+      </p:sp>
+    </p:spTree>
+    <p:extLst>
+      <p:ext uri="{BB962C8B-B14F-4D97-AF65-F5344CB8AC3E}">
+        <p14:creationId xmlns:p14="http://schemas.microsoft.com/office/powerpoint/2010/main" val="2679088927"/>
+      </p:ext>
+    </p:extLst>
+  </p:cSld>
+  <p:clrMapOvr>
+    <a:masterClrMapping/>
+  </p:clrMapOvr>
+</p:sld>
+</file>
+
+<file path=ppt/slides/slide14.xml><?xml version="1.0" encoding="utf-8"?>
+<p:sld xmlns:a="http://schemas.openxmlformats.org/drawingml/2006/main" xmlns:r="http://schemas.openxmlformats.org/officeDocument/2006/relationships" xmlns:p="http://schemas.openxmlformats.org/presentationml/2006/main">
+  <p:cSld>
+    <p:spTree>
+      <p:nvGrpSpPr>
+        <p:cNvPr id="1" name=""/>
+        <p:cNvGrpSpPr/>
+        <p:nvPr/>
+      </p:nvGrpSpPr>
+      <p:grpSpPr>
+        <a:xfrm>
+          <a:off x="0" y="0"/>
+          <a:ext cx="0" cy="0"/>
+          <a:chOff x="0" y="0"/>
+          <a:chExt cx="0" cy="0"/>
+        </a:xfrm>
+      </p:grpSpPr>
+      <p:sp>
+        <p:nvSpPr>
+          <p:cNvPr id="2" name="Title 1">
+            <a:extLst>
+              <a:ext uri="{FF2B5EF4-FFF2-40B4-BE49-F238E27FC236}">
                 <a16:creationId xmlns:a16="http://schemas.microsoft.com/office/drawing/2014/main" id="{104CAB5C-1818-D942-8BDB-0B8FE35FCDD1}"/>
               </a:ext>
             </a:extLst>
@@ -4561,7 +5471,7 @@
 </p:sld>
 </file>
 
-<file path=ppt/slides/slide14.xml><?xml version="1.0" encoding="utf-8"?>
+<file path=ppt/slides/slide15.xml><?xml version="1.0" encoding="utf-8"?>
 <p:sld xmlns:a="http://schemas.openxmlformats.org/drawingml/2006/main" xmlns:r="http://schemas.openxmlformats.org/officeDocument/2006/relationships" xmlns:p="http://schemas.openxmlformats.org/presentationml/2006/main">
   <p:cSld>
     <p:spTree>
@@ -4795,7 +5705,7 @@
 </p:sld>
 </file>
 
-<file path=ppt/slides/slide15.xml><?xml version="1.0" encoding="utf-8"?>
+<file path=ppt/slides/slide16.xml><?xml version="1.0" encoding="utf-8"?>
 <p:sld xmlns:a="http://schemas.openxmlformats.org/drawingml/2006/main" xmlns:r="http://schemas.openxmlformats.org/officeDocument/2006/relationships" xmlns:p="http://schemas.openxmlformats.org/presentationml/2006/main">
   <p:cSld>
     <p:spTree>
@@ -4917,7 +5827,7 @@
 </p:sld>
 </file>
 
-<file path=ppt/slides/slide16.xml><?xml version="1.0" encoding="utf-8"?>
+<file path=ppt/slides/slide17.xml><?xml version="1.0" encoding="utf-8"?>
 <p:sld xmlns:a="http://schemas.openxmlformats.org/drawingml/2006/main" xmlns:r="http://schemas.openxmlformats.org/officeDocument/2006/relationships" xmlns:p="http://schemas.openxmlformats.org/presentationml/2006/main">
   <p:cSld>
     <p:spTree>
@@ -5085,42 +5995,42 @@
           <a:lstStyle/>
           <a:p>
             <a:r>
-              <a:rPr lang="en-US"/>
+              <a:rPr lang="en-US" dirty="0"/>
               <a:t>Everything is different</a:t>
             </a:r>
           </a:p>
           <a:p>
             <a:r>
-              <a:rPr lang="en-US"/>
+              <a:rPr lang="en-US" dirty="0"/>
               <a:t>We will be working largely online</a:t>
             </a:r>
           </a:p>
           <a:p>
             <a:r>
-              <a:rPr lang="en-US"/>
+              <a:rPr lang="en-US" dirty="0"/>
               <a:t>Everything might evolve and change throughout the semester</a:t>
             </a:r>
           </a:p>
           <a:p>
-            <a:endParaRPr lang="en-US"/>
-          </a:p>
-          <a:p>
-            <a:r>
-              <a:rPr lang="en-US"/>
+            <a:endParaRPr lang="en-US" dirty="0"/>
+          </a:p>
+          <a:p>
+            <a:r>
+              <a:rPr lang="en-US" dirty="0"/>
               <a:t>Program of today:</a:t>
             </a:r>
           </a:p>
           <a:p>
             <a:pPr lvl="1"/>
             <a:r>
-              <a:rPr lang="en-US"/>
+              <a:rPr lang="en-US" dirty="0"/>
               <a:t>Hour 1: Everything you need to know on the organization</a:t>
             </a:r>
           </a:p>
           <a:p>
             <a:pPr lvl="1"/>
             <a:r>
-              <a:rPr lang="en-US"/>
+              <a:rPr lang="en-US" dirty="0"/>
               <a:t>Hour 2: A teaser on the contents of the class</a:t>
             </a:r>
           </a:p>
@@ -5136,6 +6046,147 @@
   <p:clrMapOvr>
     <a:masterClrMapping/>
   </p:clrMapOvr>
+  <p:timing>
+    <p:tnLst>
+      <p:par>
+        <p:cTn id="1" dur="indefinite" restart="never" nodeType="tmRoot">
+          <p:childTnLst>
+            <p:seq concurrent="1" nextAc="seek">
+              <p:cTn id="2" dur="indefinite" nodeType="mainSeq">
+                <p:childTnLst>
+                  <p:par>
+                    <p:cTn id="3" fill="hold">
+                      <p:stCondLst>
+                        <p:cond delay="indefinite"/>
+                      </p:stCondLst>
+                      <p:childTnLst>
+                        <p:par>
+                          <p:cTn id="4" fill="hold">
+                            <p:stCondLst>
+                              <p:cond delay="0"/>
+                            </p:stCondLst>
+                            <p:childTnLst>
+                              <p:par>
+                                <p:cTn id="5" presetID="1" presetClass="entr" presetSubtype="0" fill="hold" nodeType="clickEffect">
+                                  <p:stCondLst>
+                                    <p:cond delay="0"/>
+                                  </p:stCondLst>
+                                  <p:childTnLst>
+                                    <p:set>
+                                      <p:cBhvr>
+                                        <p:cTn id="6" dur="1" fill="hold">
+                                          <p:stCondLst>
+                                            <p:cond delay="0"/>
+                                          </p:stCondLst>
+                                        </p:cTn>
+                                        <p:tgtEl>
+                                          <p:spTgt spid="3">
+                                            <p:txEl>
+                                              <p:pRg st="4" end="4"/>
+                                            </p:txEl>
+                                          </p:spTgt>
+                                        </p:tgtEl>
+                                        <p:attrNameLst>
+                                          <p:attrName>style.visibility</p:attrName>
+                                        </p:attrNameLst>
+                                      </p:cBhvr>
+                                      <p:to>
+                                        <p:strVal val="visible"/>
+                                      </p:to>
+                                    </p:set>
+                                  </p:childTnLst>
+                                </p:cTn>
+                              </p:par>
+                              <p:par>
+                                <p:cTn id="7" presetID="1" presetClass="entr" presetSubtype="0" fill="hold" nodeType="withEffect">
+                                  <p:stCondLst>
+                                    <p:cond delay="0"/>
+                                  </p:stCondLst>
+                                  <p:childTnLst>
+                                    <p:set>
+                                      <p:cBhvr>
+                                        <p:cTn id="8" dur="1" fill="hold">
+                                          <p:stCondLst>
+                                            <p:cond delay="0"/>
+                                          </p:stCondLst>
+                                        </p:cTn>
+                                        <p:tgtEl>
+                                          <p:spTgt spid="3">
+                                            <p:txEl>
+                                              <p:pRg st="5" end="5"/>
+                                            </p:txEl>
+                                          </p:spTgt>
+                                        </p:tgtEl>
+                                        <p:attrNameLst>
+                                          <p:attrName>style.visibility</p:attrName>
+                                        </p:attrNameLst>
+                                      </p:cBhvr>
+                                      <p:to>
+                                        <p:strVal val="visible"/>
+                                      </p:to>
+                                    </p:set>
+                                  </p:childTnLst>
+                                </p:cTn>
+                              </p:par>
+                              <p:par>
+                                <p:cTn id="9" presetID="1" presetClass="entr" presetSubtype="0" fill="hold" nodeType="withEffect">
+                                  <p:stCondLst>
+                                    <p:cond delay="0"/>
+                                  </p:stCondLst>
+                                  <p:childTnLst>
+                                    <p:set>
+                                      <p:cBhvr>
+                                        <p:cTn id="10" dur="1" fill="hold">
+                                          <p:stCondLst>
+                                            <p:cond delay="0"/>
+                                          </p:stCondLst>
+                                        </p:cTn>
+                                        <p:tgtEl>
+                                          <p:spTgt spid="3">
+                                            <p:txEl>
+                                              <p:pRg st="6" end="6"/>
+                                            </p:txEl>
+                                          </p:spTgt>
+                                        </p:tgtEl>
+                                        <p:attrNameLst>
+                                          <p:attrName>style.visibility</p:attrName>
+                                        </p:attrNameLst>
+                                      </p:cBhvr>
+                                      <p:to>
+                                        <p:strVal val="visible"/>
+                                      </p:to>
+                                    </p:set>
+                                  </p:childTnLst>
+                                </p:cTn>
+                              </p:par>
+                            </p:childTnLst>
+                          </p:cTn>
+                        </p:par>
+                      </p:childTnLst>
+                    </p:cTn>
+                  </p:par>
+                </p:childTnLst>
+              </p:cTn>
+              <p:prevCondLst>
+                <p:cond evt="onPrev" delay="0">
+                  <p:tgtEl>
+                    <p:sldTgt/>
+                  </p:tgtEl>
+                </p:cond>
+              </p:prevCondLst>
+              <p:nextCondLst>
+                <p:cond evt="onNext" delay="0">
+                  <p:tgtEl>
+                    <p:sldTgt/>
+                  </p:tgtEl>
+                </p:cond>
+              </p:nextCondLst>
+            </p:seq>
+          </p:childTnLst>
+        </p:cTn>
+      </p:par>
+    </p:tnLst>
+  </p:timing>
 </p:sld>
 </file>
 
@@ -5336,23 +6387,28 @@
               <a:buAutoNum type="arabicPeriod"/>
             </a:pPr>
             <a:r>
-              <a:rPr lang="en-US"/>
+              <a:rPr lang="en-US" dirty="0"/>
               <a:t>Moodle</a:t>
             </a:r>
           </a:p>
           <a:p>
             <a:pPr lvl="1"/>
             <a:r>
-              <a:rPr lang="en-US"/>
+              <a:rPr lang="en-US" dirty="0"/>
               <a:t>You should be registered and you should have been there</a:t>
             </a:r>
           </a:p>
           <a:p>
             <a:pPr lvl="1"/>
             <a:r>
-              <a:rPr lang="en-US"/>
-              <a:t>You find all the links and details in the accouncements</a:t>
-            </a:r>
+              <a:rPr lang="en-US" dirty="0"/>
+              <a:t>You find all the links and details in the </a:t>
+            </a:r>
+            <a:r>
+              <a:rPr lang="en-US" dirty="0" err="1"/>
+              <a:t>accouncements</a:t>
+            </a:r>
+            <a:endParaRPr lang="en-US" dirty="0"/>
           </a:p>
           <a:p>
             <a:pPr marL="514350" indent="-514350">
@@ -5360,14 +6416,14 @@
               <a:buAutoNum type="arabicPeriod"/>
             </a:pPr>
             <a:r>
-              <a:rPr lang="en-US"/>
+              <a:rPr lang="en-US" dirty="0"/>
               <a:t>Zoom</a:t>
             </a:r>
           </a:p>
           <a:p>
             <a:pPr lvl="1"/>
             <a:r>
-              <a:rPr lang="en-US"/>
+              <a:rPr lang="en-US" dirty="0"/>
               <a:t>Since you are here you know it</a:t>
             </a:r>
           </a:p>
@@ -5377,14 +6433,15 @@
               <a:buAutoNum type="arabicPeriod"/>
             </a:pPr>
             <a:r>
-              <a:rPr lang="en-US"/>
+              <a:rPr lang="en-US" dirty="0" err="1"/>
               <a:t>Switchtube</a:t>
             </a:r>
+            <a:endParaRPr lang="en-US" dirty="0"/>
           </a:p>
           <a:p>
             <a:pPr lvl="1"/>
             <a:r>
-              <a:rPr lang="en-US"/>
+              <a:rPr lang="en-US" dirty="0"/>
               <a:t>For registered lecture and pre-registered course content</a:t>
             </a:r>
           </a:p>
@@ -5394,20 +6451,20 @@
               <a:buAutoNum type="arabicPeriod"/>
             </a:pPr>
             <a:r>
-              <a:rPr lang="en-US"/>
+              <a:rPr lang="en-US" dirty="0"/>
               <a:t>Discord</a:t>
             </a:r>
           </a:p>
           <a:p>
             <a:pPr lvl="1"/>
             <a:r>
-              <a:rPr lang="en-US"/>
-              <a:t>For exercises and interacting with your assitants</a:t>
+              <a:rPr lang="en-US" dirty="0"/>
+              <a:t>For exercises and interacting with your assistants</a:t>
             </a:r>
           </a:p>
           <a:p>
             <a:pPr lvl="1"/>
-            <a:endParaRPr lang="en-US"/>
+            <a:endParaRPr lang="en-US" dirty="0"/>
           </a:p>
         </p:txBody>
       </p:sp>
@@ -5421,6 +6478,276 @@
   <p:clrMapOvr>
     <a:masterClrMapping/>
   </p:clrMapOvr>
+  <p:timing>
+    <p:tnLst>
+      <p:par>
+        <p:cTn id="1" dur="indefinite" restart="never" nodeType="tmRoot">
+          <p:childTnLst>
+            <p:seq concurrent="1" nextAc="seek">
+              <p:cTn id="2" dur="indefinite" nodeType="mainSeq">
+                <p:childTnLst>
+                  <p:par>
+                    <p:cTn id="3" fill="hold">
+                      <p:stCondLst>
+                        <p:cond delay="indefinite"/>
+                      </p:stCondLst>
+                      <p:childTnLst>
+                        <p:par>
+                          <p:cTn id="4" fill="hold">
+                            <p:stCondLst>
+                              <p:cond delay="0"/>
+                            </p:stCondLst>
+                            <p:childTnLst>
+                              <p:par>
+                                <p:cTn id="5" presetID="1" presetClass="entr" presetSubtype="0" fill="hold" nodeType="clickEffect">
+                                  <p:stCondLst>
+                                    <p:cond delay="0"/>
+                                  </p:stCondLst>
+                                  <p:childTnLst>
+                                    <p:set>
+                                      <p:cBhvr>
+                                        <p:cTn id="6" dur="1" fill="hold">
+                                          <p:stCondLst>
+                                            <p:cond delay="0"/>
+                                          </p:stCondLst>
+                                        </p:cTn>
+                                        <p:tgtEl>
+                                          <p:spTgt spid="3">
+                                            <p:txEl>
+                                              <p:pRg st="3" end="3"/>
+                                            </p:txEl>
+                                          </p:spTgt>
+                                        </p:tgtEl>
+                                        <p:attrNameLst>
+                                          <p:attrName>style.visibility</p:attrName>
+                                        </p:attrNameLst>
+                                      </p:cBhvr>
+                                      <p:to>
+                                        <p:strVal val="visible"/>
+                                      </p:to>
+                                    </p:set>
+                                  </p:childTnLst>
+                                </p:cTn>
+                              </p:par>
+                              <p:par>
+                                <p:cTn id="7" presetID="1" presetClass="entr" presetSubtype="0" fill="hold" nodeType="withEffect">
+                                  <p:stCondLst>
+                                    <p:cond delay="0"/>
+                                  </p:stCondLst>
+                                  <p:childTnLst>
+                                    <p:set>
+                                      <p:cBhvr>
+                                        <p:cTn id="8" dur="1" fill="hold">
+                                          <p:stCondLst>
+                                            <p:cond delay="0"/>
+                                          </p:stCondLst>
+                                        </p:cTn>
+                                        <p:tgtEl>
+                                          <p:spTgt spid="3">
+                                            <p:txEl>
+                                              <p:pRg st="4" end="4"/>
+                                            </p:txEl>
+                                          </p:spTgt>
+                                        </p:tgtEl>
+                                        <p:attrNameLst>
+                                          <p:attrName>style.visibility</p:attrName>
+                                        </p:attrNameLst>
+                                      </p:cBhvr>
+                                      <p:to>
+                                        <p:strVal val="visible"/>
+                                      </p:to>
+                                    </p:set>
+                                  </p:childTnLst>
+                                </p:cTn>
+                              </p:par>
+                            </p:childTnLst>
+                          </p:cTn>
+                        </p:par>
+                      </p:childTnLst>
+                    </p:cTn>
+                  </p:par>
+                  <p:par>
+                    <p:cTn id="9" fill="hold">
+                      <p:stCondLst>
+                        <p:cond delay="indefinite"/>
+                      </p:stCondLst>
+                      <p:childTnLst>
+                        <p:par>
+                          <p:cTn id="10" fill="hold">
+                            <p:stCondLst>
+                              <p:cond delay="0"/>
+                            </p:stCondLst>
+                            <p:childTnLst>
+                              <p:par>
+                                <p:cTn id="11" presetID="1" presetClass="entr" presetSubtype="0" fill="hold" nodeType="clickEffect">
+                                  <p:stCondLst>
+                                    <p:cond delay="0"/>
+                                  </p:stCondLst>
+                                  <p:childTnLst>
+                                    <p:set>
+                                      <p:cBhvr>
+                                        <p:cTn id="12" dur="1" fill="hold">
+                                          <p:stCondLst>
+                                            <p:cond delay="0"/>
+                                          </p:stCondLst>
+                                        </p:cTn>
+                                        <p:tgtEl>
+                                          <p:spTgt spid="3">
+                                            <p:txEl>
+                                              <p:pRg st="5" end="5"/>
+                                            </p:txEl>
+                                          </p:spTgt>
+                                        </p:tgtEl>
+                                        <p:attrNameLst>
+                                          <p:attrName>style.visibility</p:attrName>
+                                        </p:attrNameLst>
+                                      </p:cBhvr>
+                                      <p:to>
+                                        <p:strVal val="visible"/>
+                                      </p:to>
+                                    </p:set>
+                                  </p:childTnLst>
+                                </p:cTn>
+                              </p:par>
+                              <p:par>
+                                <p:cTn id="13" presetID="1" presetClass="entr" presetSubtype="0" fill="hold" nodeType="withEffect">
+                                  <p:stCondLst>
+                                    <p:cond delay="0"/>
+                                  </p:stCondLst>
+                                  <p:childTnLst>
+                                    <p:set>
+                                      <p:cBhvr>
+                                        <p:cTn id="14" dur="1" fill="hold">
+                                          <p:stCondLst>
+                                            <p:cond delay="0"/>
+                                          </p:stCondLst>
+                                        </p:cTn>
+                                        <p:tgtEl>
+                                          <p:spTgt spid="3">
+                                            <p:txEl>
+                                              <p:pRg st="6" end="6"/>
+                                            </p:txEl>
+                                          </p:spTgt>
+                                        </p:tgtEl>
+                                        <p:attrNameLst>
+                                          <p:attrName>style.visibility</p:attrName>
+                                        </p:attrNameLst>
+                                      </p:cBhvr>
+                                      <p:to>
+                                        <p:strVal val="visible"/>
+                                      </p:to>
+                                    </p:set>
+                                  </p:childTnLst>
+                                </p:cTn>
+                              </p:par>
+                            </p:childTnLst>
+                          </p:cTn>
+                        </p:par>
+                      </p:childTnLst>
+                    </p:cTn>
+                  </p:par>
+                  <p:par>
+                    <p:cTn id="15" fill="hold">
+                      <p:stCondLst>
+                        <p:cond delay="indefinite"/>
+                      </p:stCondLst>
+                      <p:childTnLst>
+                        <p:par>
+                          <p:cTn id="16" fill="hold">
+                            <p:stCondLst>
+                              <p:cond delay="0"/>
+                            </p:stCondLst>
+                            <p:childTnLst>
+                              <p:par>
+                                <p:cTn id="17" presetID="1" presetClass="entr" presetSubtype="0" fill="hold" nodeType="clickEffect">
+                                  <p:stCondLst>
+                                    <p:cond delay="0"/>
+                                  </p:stCondLst>
+                                  <p:childTnLst>
+                                    <p:set>
+                                      <p:cBhvr>
+                                        <p:cTn id="18" dur="1" fill="hold">
+                                          <p:stCondLst>
+                                            <p:cond delay="0"/>
+                                          </p:stCondLst>
+                                        </p:cTn>
+                                        <p:tgtEl>
+                                          <p:spTgt spid="3">
+                                            <p:txEl>
+                                              <p:pRg st="7" end="7"/>
+                                            </p:txEl>
+                                          </p:spTgt>
+                                        </p:tgtEl>
+                                        <p:attrNameLst>
+                                          <p:attrName>style.visibility</p:attrName>
+                                        </p:attrNameLst>
+                                      </p:cBhvr>
+                                      <p:to>
+                                        <p:strVal val="visible"/>
+                                      </p:to>
+                                    </p:set>
+                                  </p:childTnLst>
+                                </p:cTn>
+                              </p:par>
+                              <p:par>
+                                <p:cTn id="19" presetID="1" presetClass="entr" presetSubtype="0" fill="hold" nodeType="withEffect">
+                                  <p:stCondLst>
+                                    <p:cond delay="0"/>
+                                  </p:stCondLst>
+                                  <p:childTnLst>
+                                    <p:set>
+                                      <p:cBhvr>
+                                        <p:cTn id="20" dur="1" fill="hold">
+                                          <p:stCondLst>
+                                            <p:cond delay="0"/>
+                                          </p:stCondLst>
+                                        </p:cTn>
+                                        <p:tgtEl>
+                                          <p:spTgt spid="3">
+                                            <p:txEl>
+                                              <p:pRg st="8" end="8"/>
+                                            </p:txEl>
+                                          </p:spTgt>
+                                        </p:tgtEl>
+                                        <p:attrNameLst>
+                                          <p:attrName>style.visibility</p:attrName>
+                                        </p:attrNameLst>
+                                      </p:cBhvr>
+                                      <p:to>
+                                        <p:strVal val="visible"/>
+                                      </p:to>
+                                    </p:set>
+                                  </p:childTnLst>
+                                </p:cTn>
+                              </p:par>
+                            </p:childTnLst>
+                          </p:cTn>
+                        </p:par>
+                      </p:childTnLst>
+                    </p:cTn>
+                  </p:par>
+                </p:childTnLst>
+              </p:cTn>
+              <p:prevCondLst>
+                <p:cond evt="onPrev" delay="0">
+                  <p:tgtEl>
+                    <p:sldTgt/>
+                  </p:tgtEl>
+                </p:cond>
+              </p:prevCondLst>
+              <p:nextCondLst>
+                <p:cond evt="onNext" delay="0">
+                  <p:tgtEl>
+                    <p:sldTgt/>
+                  </p:tgtEl>
+                </p:cond>
+              </p:nextCondLst>
+            </p:seq>
+          </p:childTnLst>
+        </p:cTn>
+      </p:par>
+    </p:tnLst>
+  </p:timing>
 </p:sld>
 </file>
 
@@ -5606,11 +6933,11 @@
               <a:buNone/>
             </a:pPr>
             <a:r>
-              <a:rPr lang="en-US"/>
+              <a:rPr lang="en-US" dirty="0"/>
               <a:t>Every week is dedicated to a </a:t>
             </a:r>
             <a:r>
-              <a:rPr lang="en-US" b="1"/>
+              <a:rPr lang="en-US" b="1" dirty="0"/>
               <a:t>Topic</a:t>
             </a:r>
           </a:p>
@@ -5619,91 +6946,103 @@
               <a:buNone/>
             </a:pPr>
             <a:r>
-              <a:rPr lang="en-US"/>
+              <a:rPr lang="en-US" dirty="0"/>
               <a:t>We will proceed in the following steps:</a:t>
             </a:r>
           </a:p>
           <a:p>
             <a:r>
-              <a:rPr lang="en-US" u="sng"/>
+              <a:rPr lang="en-US" u="sng" dirty="0"/>
               <a:t>Friday afternoon</a:t>
             </a:r>
             <a:r>
-              <a:rPr lang="en-US"/>
+              <a:rPr lang="en-US" dirty="0"/>
               <a:t>, 16:00 – 18:00: </a:t>
             </a:r>
             <a:r>
-              <a:rPr lang="en-US" b="1"/>
+              <a:rPr lang="en-US" b="1" dirty="0"/>
               <a:t>self-study</a:t>
             </a:r>
           </a:p>
           <a:p>
             <a:pPr lvl="1"/>
             <a:r>
-              <a:rPr lang="en-US" b="1"/>
+              <a:rPr lang="en-US" b="1" dirty="0"/>
               <a:t>Pre-registered videos, chapters for reading, slides, exercises</a:t>
             </a:r>
           </a:p>
           <a:p>
             <a:pPr lvl="1"/>
             <a:r>
-              <a:rPr lang="en-US" b="1"/>
-              <a:t>Switchtube, Moodle, Discord</a:t>
-            </a:r>
-          </a:p>
-          <a:p>
-            <a:r>
-              <a:rPr lang="en-US" u="sng"/>
+              <a:rPr lang="en-US" b="1" dirty="0" err="1"/>
+              <a:t>Switchtube</a:t>
+            </a:r>
+            <a:r>
+              <a:rPr lang="en-US" b="1" dirty="0"/>
+              <a:t>, Moodle, Discord</a:t>
+            </a:r>
+          </a:p>
+          <a:p>
+            <a:r>
+              <a:rPr lang="en-US" u="sng" dirty="0"/>
               <a:t>Tuesday morning</a:t>
             </a:r>
             <a:r>
-              <a:rPr lang="en-US"/>
+              <a:rPr lang="en-US" dirty="0"/>
               <a:t>, 8:00 – 10:00: </a:t>
             </a:r>
             <a:r>
-              <a:rPr lang="en-US" b="1"/>
+              <a:rPr lang="en-US" b="1" dirty="0"/>
               <a:t>online session</a:t>
             </a:r>
           </a:p>
           <a:p>
             <a:pPr lvl="1"/>
             <a:r>
-              <a:rPr lang="en-US" b="1"/>
+              <a:rPr lang="en-US" b="1" dirty="0"/>
               <a:t>Content summary, quizzes, question-answer, elaborate examples and proofs</a:t>
             </a:r>
           </a:p>
           <a:p>
             <a:pPr lvl="1"/>
             <a:r>
-              <a:rPr lang="en-US" b="1"/>
-              <a:t>Zoom, Switchtube (registered session)</a:t>
-            </a:r>
-          </a:p>
-          <a:p>
-            <a:r>
-              <a:rPr lang="en-US" u="sng"/>
+              <a:rPr lang="en-US" b="1" dirty="0"/>
+              <a:t>Zoom, </a:t>
+            </a:r>
+            <a:r>
+              <a:rPr lang="en-US" b="1" dirty="0" err="1"/>
+              <a:t>Switchtube</a:t>
+            </a:r>
+            <a:r>
+              <a:rPr lang="en-US" b="1" dirty="0"/>
+              <a:t> (registered session)</a:t>
+            </a:r>
+          </a:p>
+          <a:p>
+            <a:r>
+              <a:rPr lang="en-US" u="sng" dirty="0"/>
               <a:t>Friday morning, </a:t>
             </a:r>
             <a:r>
-              <a:rPr lang="en-US"/>
+              <a:rPr lang="en-US" dirty="0"/>
               <a:t>10:00 – 12:00: </a:t>
             </a:r>
             <a:r>
-              <a:rPr lang="en-US" b="1"/>
+              <a:rPr lang="en-US" b="1" dirty="0"/>
               <a:t>exercise</a:t>
             </a:r>
           </a:p>
           <a:p>
             <a:pPr lvl="1"/>
             <a:r>
-              <a:rPr lang="en-US" b="1"/>
+              <a:rPr lang="en-US" b="1" dirty="0"/>
               <a:t>Exercises, interaction with assistants, on-campus</a:t>
             </a:r>
           </a:p>
           <a:p>
             <a:pPr lvl="1"/>
             <a:r>
-              <a:rPr lang="en-US" b="1"/>
+              <a:rPr lang="en-US" b="1" dirty="0"/>
               <a:t>Discord</a:t>
             </a:r>
           </a:p>
@@ -5719,6 +7058,369 @@
   <p:clrMapOvr>
     <a:masterClrMapping/>
   </p:clrMapOvr>
+  <p:timing>
+    <p:tnLst>
+      <p:par>
+        <p:cTn id="1" dur="indefinite" restart="never" nodeType="tmRoot">
+          <p:childTnLst>
+            <p:seq concurrent="1" nextAc="seek">
+              <p:cTn id="2" dur="indefinite" nodeType="mainSeq">
+                <p:childTnLst>
+                  <p:par>
+                    <p:cTn id="3" fill="hold">
+                      <p:stCondLst>
+                        <p:cond delay="indefinite"/>
+                      </p:stCondLst>
+                      <p:childTnLst>
+                        <p:par>
+                          <p:cTn id="4" fill="hold">
+                            <p:stCondLst>
+                              <p:cond delay="0"/>
+                            </p:stCondLst>
+                            <p:childTnLst>
+                              <p:par>
+                                <p:cTn id="5" presetID="1" presetClass="entr" presetSubtype="0" fill="hold" nodeType="clickEffect">
+                                  <p:stCondLst>
+                                    <p:cond delay="0"/>
+                                  </p:stCondLst>
+                                  <p:childTnLst>
+                                    <p:set>
+                                      <p:cBhvr>
+                                        <p:cTn id="6" dur="1" fill="hold">
+                                          <p:stCondLst>
+                                            <p:cond delay="0"/>
+                                          </p:stCondLst>
+                                        </p:cTn>
+                                        <p:tgtEl>
+                                          <p:spTgt spid="3">
+                                            <p:txEl>
+                                              <p:pRg st="2" end="2"/>
+                                            </p:txEl>
+                                          </p:spTgt>
+                                        </p:tgtEl>
+                                        <p:attrNameLst>
+                                          <p:attrName>style.visibility</p:attrName>
+                                        </p:attrNameLst>
+                                      </p:cBhvr>
+                                      <p:to>
+                                        <p:strVal val="visible"/>
+                                      </p:to>
+                                    </p:set>
+                                  </p:childTnLst>
+                                </p:cTn>
+                              </p:par>
+                              <p:par>
+                                <p:cTn id="7" presetID="1" presetClass="entr" presetSubtype="0" fill="hold" nodeType="withEffect">
+                                  <p:stCondLst>
+                                    <p:cond delay="0"/>
+                                  </p:stCondLst>
+                                  <p:childTnLst>
+                                    <p:set>
+                                      <p:cBhvr>
+                                        <p:cTn id="8" dur="1" fill="hold">
+                                          <p:stCondLst>
+                                            <p:cond delay="0"/>
+                                          </p:stCondLst>
+                                        </p:cTn>
+                                        <p:tgtEl>
+                                          <p:spTgt spid="3">
+                                            <p:txEl>
+                                              <p:pRg st="3" end="3"/>
+                                            </p:txEl>
+                                          </p:spTgt>
+                                        </p:tgtEl>
+                                        <p:attrNameLst>
+                                          <p:attrName>style.visibility</p:attrName>
+                                        </p:attrNameLst>
+                                      </p:cBhvr>
+                                      <p:to>
+                                        <p:strVal val="visible"/>
+                                      </p:to>
+                                    </p:set>
+                                  </p:childTnLst>
+                                </p:cTn>
+                              </p:par>
+                              <p:par>
+                                <p:cTn id="9" presetID="1" presetClass="entr" presetSubtype="0" fill="hold" nodeType="withEffect">
+                                  <p:stCondLst>
+                                    <p:cond delay="0"/>
+                                  </p:stCondLst>
+                                  <p:childTnLst>
+                                    <p:set>
+                                      <p:cBhvr>
+                                        <p:cTn id="10" dur="1" fill="hold">
+                                          <p:stCondLst>
+                                            <p:cond delay="0"/>
+                                          </p:stCondLst>
+                                        </p:cTn>
+                                        <p:tgtEl>
+                                          <p:spTgt spid="3">
+                                            <p:txEl>
+                                              <p:pRg st="4" end="4"/>
+                                            </p:txEl>
+                                          </p:spTgt>
+                                        </p:tgtEl>
+                                        <p:attrNameLst>
+                                          <p:attrName>style.visibility</p:attrName>
+                                        </p:attrNameLst>
+                                      </p:cBhvr>
+                                      <p:to>
+                                        <p:strVal val="visible"/>
+                                      </p:to>
+                                    </p:set>
+                                  </p:childTnLst>
+                                </p:cTn>
+                              </p:par>
+                            </p:childTnLst>
+                          </p:cTn>
+                        </p:par>
+                      </p:childTnLst>
+                    </p:cTn>
+                  </p:par>
+                  <p:par>
+                    <p:cTn id="11" fill="hold">
+                      <p:stCondLst>
+                        <p:cond delay="indefinite"/>
+                      </p:stCondLst>
+                      <p:childTnLst>
+                        <p:par>
+                          <p:cTn id="12" fill="hold">
+                            <p:stCondLst>
+                              <p:cond delay="0"/>
+                            </p:stCondLst>
+                            <p:childTnLst>
+                              <p:par>
+                                <p:cTn id="13" presetID="1" presetClass="entr" presetSubtype="0" fill="hold" nodeType="clickEffect">
+                                  <p:stCondLst>
+                                    <p:cond delay="0"/>
+                                  </p:stCondLst>
+                                  <p:childTnLst>
+                                    <p:set>
+                                      <p:cBhvr>
+                                        <p:cTn id="14" dur="1" fill="hold">
+                                          <p:stCondLst>
+                                            <p:cond delay="0"/>
+                                          </p:stCondLst>
+                                        </p:cTn>
+                                        <p:tgtEl>
+                                          <p:spTgt spid="3">
+                                            <p:txEl>
+                                              <p:pRg st="5" end="5"/>
+                                            </p:txEl>
+                                          </p:spTgt>
+                                        </p:tgtEl>
+                                        <p:attrNameLst>
+                                          <p:attrName>style.visibility</p:attrName>
+                                        </p:attrNameLst>
+                                      </p:cBhvr>
+                                      <p:to>
+                                        <p:strVal val="visible"/>
+                                      </p:to>
+                                    </p:set>
+                                  </p:childTnLst>
+                                </p:cTn>
+                              </p:par>
+                              <p:par>
+                                <p:cTn id="15" presetID="1" presetClass="entr" presetSubtype="0" fill="hold" nodeType="withEffect">
+                                  <p:stCondLst>
+                                    <p:cond delay="0"/>
+                                  </p:stCondLst>
+                                  <p:childTnLst>
+                                    <p:set>
+                                      <p:cBhvr>
+                                        <p:cTn id="16" dur="1" fill="hold">
+                                          <p:stCondLst>
+                                            <p:cond delay="0"/>
+                                          </p:stCondLst>
+                                        </p:cTn>
+                                        <p:tgtEl>
+                                          <p:spTgt spid="3">
+                                            <p:txEl>
+                                              <p:pRg st="6" end="6"/>
+                                            </p:txEl>
+                                          </p:spTgt>
+                                        </p:tgtEl>
+                                        <p:attrNameLst>
+                                          <p:attrName>style.visibility</p:attrName>
+                                        </p:attrNameLst>
+                                      </p:cBhvr>
+                                      <p:to>
+                                        <p:strVal val="visible"/>
+                                      </p:to>
+                                    </p:set>
+                                  </p:childTnLst>
+                                </p:cTn>
+                              </p:par>
+                              <p:par>
+                                <p:cTn id="17" presetID="1" presetClass="entr" presetSubtype="0" fill="hold" nodeType="withEffect">
+                                  <p:stCondLst>
+                                    <p:cond delay="0"/>
+                                  </p:stCondLst>
+                                  <p:childTnLst>
+                                    <p:set>
+                                      <p:cBhvr>
+                                        <p:cTn id="18" dur="1" fill="hold">
+                                          <p:stCondLst>
+                                            <p:cond delay="0"/>
+                                          </p:stCondLst>
+                                        </p:cTn>
+                                        <p:tgtEl>
+                                          <p:spTgt spid="3">
+                                            <p:txEl>
+                                              <p:pRg st="7" end="7"/>
+                                            </p:txEl>
+                                          </p:spTgt>
+                                        </p:tgtEl>
+                                        <p:attrNameLst>
+                                          <p:attrName>style.visibility</p:attrName>
+                                        </p:attrNameLst>
+                                      </p:cBhvr>
+                                      <p:to>
+                                        <p:strVal val="visible"/>
+                                      </p:to>
+                                    </p:set>
+                                  </p:childTnLst>
+                                </p:cTn>
+                              </p:par>
+                            </p:childTnLst>
+                          </p:cTn>
+                        </p:par>
+                      </p:childTnLst>
+                    </p:cTn>
+                  </p:par>
+                  <p:par>
+                    <p:cTn id="19" fill="hold">
+                      <p:stCondLst>
+                        <p:cond delay="indefinite"/>
+                      </p:stCondLst>
+                      <p:childTnLst>
+                        <p:par>
+                          <p:cTn id="20" fill="hold">
+                            <p:stCondLst>
+                              <p:cond delay="0"/>
+                            </p:stCondLst>
+                            <p:childTnLst>
+                              <p:par>
+                                <p:cTn id="21" presetID="1" presetClass="entr" presetSubtype="0" fill="hold" nodeType="clickEffect">
+                                  <p:stCondLst>
+                                    <p:cond delay="0"/>
+                                  </p:stCondLst>
+                                  <p:childTnLst>
+                                    <p:set>
+                                      <p:cBhvr>
+                                        <p:cTn id="22" dur="1" fill="hold">
+                                          <p:stCondLst>
+                                            <p:cond delay="0"/>
+                                          </p:stCondLst>
+                                        </p:cTn>
+                                        <p:tgtEl>
+                                          <p:spTgt spid="3">
+                                            <p:txEl>
+                                              <p:pRg st="8" end="8"/>
+                                            </p:txEl>
+                                          </p:spTgt>
+                                        </p:tgtEl>
+                                        <p:attrNameLst>
+                                          <p:attrName>style.visibility</p:attrName>
+                                        </p:attrNameLst>
+                                      </p:cBhvr>
+                                      <p:to>
+                                        <p:strVal val="visible"/>
+                                      </p:to>
+                                    </p:set>
+                                  </p:childTnLst>
+                                </p:cTn>
+                              </p:par>
+                              <p:par>
+                                <p:cTn id="23" presetID="1" presetClass="entr" presetSubtype="0" fill="hold" nodeType="withEffect">
+                                  <p:stCondLst>
+                                    <p:cond delay="0"/>
+                                  </p:stCondLst>
+                                  <p:childTnLst>
+                                    <p:set>
+                                      <p:cBhvr>
+                                        <p:cTn id="24" dur="1" fill="hold">
+                                          <p:stCondLst>
+                                            <p:cond delay="0"/>
+                                          </p:stCondLst>
+                                        </p:cTn>
+                                        <p:tgtEl>
+                                          <p:spTgt spid="3">
+                                            <p:txEl>
+                                              <p:pRg st="9" end="9"/>
+                                            </p:txEl>
+                                          </p:spTgt>
+                                        </p:tgtEl>
+                                        <p:attrNameLst>
+                                          <p:attrName>style.visibility</p:attrName>
+                                        </p:attrNameLst>
+                                      </p:cBhvr>
+                                      <p:to>
+                                        <p:strVal val="visible"/>
+                                      </p:to>
+                                    </p:set>
+                                  </p:childTnLst>
+                                </p:cTn>
+                              </p:par>
+                              <p:par>
+                                <p:cTn id="25" presetID="1" presetClass="entr" presetSubtype="0" fill="hold" nodeType="withEffect">
+                                  <p:stCondLst>
+                                    <p:cond delay="0"/>
+                                  </p:stCondLst>
+                                  <p:childTnLst>
+                                    <p:set>
+                                      <p:cBhvr>
+                                        <p:cTn id="26" dur="1" fill="hold">
+                                          <p:stCondLst>
+                                            <p:cond delay="0"/>
+                                          </p:stCondLst>
+                                        </p:cTn>
+                                        <p:tgtEl>
+                                          <p:spTgt spid="3">
+                                            <p:txEl>
+                                              <p:pRg st="10" end="10"/>
+                                            </p:txEl>
+                                          </p:spTgt>
+                                        </p:tgtEl>
+                                        <p:attrNameLst>
+                                          <p:attrName>style.visibility</p:attrName>
+                                        </p:attrNameLst>
+                                      </p:cBhvr>
+                                      <p:to>
+                                        <p:strVal val="visible"/>
+                                      </p:to>
+                                    </p:set>
+                                  </p:childTnLst>
+                                </p:cTn>
+                              </p:par>
+                            </p:childTnLst>
+                          </p:cTn>
+                        </p:par>
+                      </p:childTnLst>
+                    </p:cTn>
+                  </p:par>
+                </p:childTnLst>
+              </p:cTn>
+              <p:prevCondLst>
+                <p:cond evt="onPrev" delay="0">
+                  <p:tgtEl>
+                    <p:sldTgt/>
+                  </p:tgtEl>
+                </p:cond>
+              </p:prevCondLst>
+              <p:nextCondLst>
+                <p:cond evt="onNext" delay="0">
+                  <p:tgtEl>
+                    <p:sldTgt/>
+                  </p:tgtEl>
+                </p:cond>
+              </p:nextCondLst>
+            </p:seq>
+          </p:childTnLst>
+        </p:cTn>
+      </p:par>
+    </p:tnLst>
+  </p:timing>
 </p:sld>
 </file>
 
@@ -5954,7 +7656,7 @@
           <p:cNvPr id="2" name="Title 1">
             <a:extLst>
               <a:ext uri="{FF2B5EF4-FFF2-40B4-BE49-F238E27FC236}">
-                <a16:creationId xmlns:a16="http://schemas.microsoft.com/office/drawing/2014/main" id="{98374F3A-0EFF-6545-BAA2-683AF01138CA}"/>
+                <a16:creationId xmlns:a16="http://schemas.microsoft.com/office/drawing/2014/main" id="{85B6266D-E139-814C-B57A-CF857ADDAE76}"/>
               </a:ext>
             </a:extLst>
           </p:cNvPr>
@@ -5971,57 +7673,45 @@
           <a:lstStyle/>
           <a:p>
             <a:r>
-              <a:rPr lang="en-US"/>
-              <a:t>Attendance</a:t>
-            </a:r>
-          </a:p>
-        </p:txBody>
-      </p:sp>
-      <p:sp>
-        <p:nvSpPr>
-          <p:cNvPr id="3" name="Content Placeholder 2">
-            <a:extLst>
-              <a:ext uri="{FF2B5EF4-FFF2-40B4-BE49-F238E27FC236}">
-                <a16:creationId xmlns:a16="http://schemas.microsoft.com/office/drawing/2014/main" id="{CD6DDEE3-67FA-6F40-A2BC-90B476DB9591}"/>
-              </a:ext>
-            </a:extLst>
-          </p:cNvPr>
-          <p:cNvSpPr>
-            <a:spLocks noGrp="1"/>
-          </p:cNvSpPr>
+              <a:rPr lang="en-US" dirty="0"/>
+              <a:t>Student Teams on Discord</a:t>
+            </a:r>
+          </a:p>
+        </p:txBody>
+      </p:sp>
+      <p:pic>
+        <p:nvPicPr>
+          <p:cNvPr id="5" name="Content Placeholder 4">
+            <a:extLst>
+              <a:ext uri="{FF2B5EF4-FFF2-40B4-BE49-F238E27FC236}">
+                <a16:creationId xmlns:a16="http://schemas.microsoft.com/office/drawing/2014/main" id="{8C86799C-F4F8-D549-972E-14900F6C04F8}"/>
+              </a:ext>
+            </a:extLst>
+          </p:cNvPr>
+          <p:cNvPicPr>
+            <a:picLocks noGrp="1" noChangeAspect="1"/>
+          </p:cNvPicPr>
           <p:nvPr>
             <p:ph idx="1"/>
           </p:nvPr>
-        </p:nvSpPr>
-        <p:spPr/>
-        <p:txBody>
-          <a:bodyPr/>
-          <a:lstStyle/>
-          <a:p>
-            <a:r>
-              <a:rPr lang="en-GB"/>
-              <a:t>Attending the online lectures or participating in the exercise sessions is not mandatory, but strongly recommended. </a:t>
-            </a:r>
-          </a:p>
-          <a:p>
-            <a:endParaRPr lang="en-GB"/>
-          </a:p>
-          <a:p>
-            <a:r>
-              <a:rPr lang="en-GB"/>
-              <a:t>It is also recommended to actively participate through questions!</a:t>
-            </a:r>
-            <a:br>
-              <a:rPr lang="en-GB"/>
-            </a:br>
-            <a:endParaRPr lang="en-US"/>
-          </a:p>
-        </p:txBody>
-      </p:sp>
+        </p:nvPicPr>
+        <p:blipFill>
+          <a:blip r:embed="rId2"/>
+          <a:stretch>
+            <a:fillRect/>
+          </a:stretch>
+        </p:blipFill>
+        <p:spPr>
+          <a:xfrm>
+            <a:off x="3502847" y="1825625"/>
+            <a:ext cx="5186306" cy="4351338"/>
+          </a:xfrm>
+        </p:spPr>
+      </p:pic>
     </p:spTree>
     <p:extLst>
       <p:ext uri="{BB962C8B-B14F-4D97-AF65-F5344CB8AC3E}">
-        <p14:creationId xmlns:p14="http://schemas.microsoft.com/office/powerpoint/2010/main" val="4183796943"/>
+        <p14:creationId xmlns:p14="http://schemas.microsoft.com/office/powerpoint/2010/main" val="2048422735"/>
       </p:ext>
     </p:extLst>
   </p:cSld>
@@ -6053,7 +7743,7 @@
           <p:cNvPr id="2" name="Title 1">
             <a:extLst>
               <a:ext uri="{FF2B5EF4-FFF2-40B4-BE49-F238E27FC236}">
-                <a16:creationId xmlns:a16="http://schemas.microsoft.com/office/drawing/2014/main" id="{A2F38300-EC12-5E4B-AAF1-1C617CF70063}"/>
+                <a16:creationId xmlns:a16="http://schemas.microsoft.com/office/drawing/2014/main" id="{98374F3A-0EFF-6545-BAA2-683AF01138CA}"/>
               </a:ext>
             </a:extLst>
           </p:cNvPr>
@@ -6071,7 +7761,7 @@
           <a:p>
             <a:r>
               <a:rPr lang="en-US"/>
-              <a:t>Questions</a:t>
+              <a:t>Attendance</a:t>
             </a:r>
           </a:p>
         </p:txBody>
@@ -6081,7 +7771,7 @@
           <p:cNvPr id="3" name="Content Placeholder 2">
             <a:extLst>
               <a:ext uri="{FF2B5EF4-FFF2-40B4-BE49-F238E27FC236}">
-                <a16:creationId xmlns:a16="http://schemas.microsoft.com/office/drawing/2014/main" id="{CEA3B914-BC1D-E242-B553-A73400FC4178}"/>
+                <a16:creationId xmlns:a16="http://schemas.microsoft.com/office/drawing/2014/main" id="{CD6DDEE3-67FA-6F40-A2BC-90B476DB9591}"/>
               </a:ext>
             </a:extLst>
           </p:cNvPr>
@@ -6097,514 +7787,30 @@
           <a:bodyPr/>
           <a:lstStyle/>
           <a:p>
-            <a:pPr marL="0" indent="0">
-              <a:buNone/>
-            </a:pPr>
-            <a:r>
-              <a:rPr lang="en-US"/>
-              <a:t>You have 4 channels to ask questions</a:t>
-            </a:r>
-          </a:p>
-          <a:p>
+            <a:r>
+              <a:rPr lang="en-GB"/>
+              <a:t>Attending the online lectures or participating in the exercise sessions is not mandatory, but strongly recommended. </a:t>
+            </a:r>
+          </a:p>
+          <a:p>
+            <a:endParaRPr lang="en-GB"/>
+          </a:p>
+          <a:p>
+            <a:r>
+              <a:rPr lang="en-GB"/>
+              <a:t>It is also recommended to actively participate through questions!</a:t>
+            </a:r>
+            <a:br>
+              <a:rPr lang="en-GB"/>
+            </a:br>
             <a:endParaRPr lang="en-US"/>
           </a:p>
         </p:txBody>
       </p:sp>
-      <p:graphicFrame>
-        <p:nvGraphicFramePr>
-          <p:cNvPr id="4" name="Table 3">
-            <a:extLst>
-              <a:ext uri="{FF2B5EF4-FFF2-40B4-BE49-F238E27FC236}">
-                <a16:creationId xmlns:a16="http://schemas.microsoft.com/office/drawing/2014/main" id="{E6062EDC-736D-0047-9EC8-CA2D47E27289}"/>
-              </a:ext>
-            </a:extLst>
-          </p:cNvPr>
-          <p:cNvGraphicFramePr>
-            <a:graphicFrameLocks noGrp="1"/>
-          </p:cNvGraphicFramePr>
-          <p:nvPr>
-            <p:extLst>
-              <p:ext uri="{D42A27DB-BD31-4B8C-83A1-F6EECF244321}">
-                <p14:modId xmlns:p14="http://schemas.microsoft.com/office/powerpoint/2010/main" val="2474538415"/>
-              </p:ext>
-            </p:extLst>
-          </p:nvPr>
-        </p:nvGraphicFramePr>
-        <p:xfrm>
-          <a:off x="1244600" y="2715957"/>
-          <a:ext cx="9918700" cy="2392680"/>
-        </p:xfrm>
-        <a:graphic>
-          <a:graphicData uri="http://schemas.openxmlformats.org/drawingml/2006/table">
-            <a:tbl>
-              <a:tblPr firstRow="1" bandRow="1">
-                <a:tableStyleId>{5C22544A-7EE6-4342-B048-85BDC9FD1C3A}</a:tableStyleId>
-              </a:tblPr>
-              <a:tblGrid>
-                <a:gridCol w="1983740">
-                  <a:extLst>
-                    <a:ext uri="{9D8B030D-6E8A-4147-A177-3AD203B41FA5}">
-                      <a16:colId xmlns:a16="http://schemas.microsoft.com/office/drawing/2014/main" val="1943112452"/>
-                    </a:ext>
-                  </a:extLst>
-                </a:gridCol>
-                <a:gridCol w="1983740">
-                  <a:extLst>
-                    <a:ext uri="{9D8B030D-6E8A-4147-A177-3AD203B41FA5}">
-                      <a16:colId xmlns:a16="http://schemas.microsoft.com/office/drawing/2014/main" val="3938429733"/>
-                    </a:ext>
-                  </a:extLst>
-                </a:gridCol>
-                <a:gridCol w="1983740">
-                  <a:extLst>
-                    <a:ext uri="{9D8B030D-6E8A-4147-A177-3AD203B41FA5}">
-                      <a16:colId xmlns:a16="http://schemas.microsoft.com/office/drawing/2014/main" val="2416875914"/>
-                    </a:ext>
-                  </a:extLst>
-                </a:gridCol>
-                <a:gridCol w="1983740">
-                  <a:extLst>
-                    <a:ext uri="{9D8B030D-6E8A-4147-A177-3AD203B41FA5}">
-                      <a16:colId xmlns:a16="http://schemas.microsoft.com/office/drawing/2014/main" val="2984967369"/>
-                    </a:ext>
-                  </a:extLst>
-                </a:gridCol>
-                <a:gridCol w="1983740">
-                  <a:extLst>
-                    <a:ext uri="{9D8B030D-6E8A-4147-A177-3AD203B41FA5}">
-                      <a16:colId xmlns:a16="http://schemas.microsoft.com/office/drawing/2014/main" val="3848360245"/>
-                    </a:ext>
-                  </a:extLst>
-                </a:gridCol>
-              </a:tblGrid>
-              <a:tr h="370840">
-                <a:tc>
-                  <a:txBody>
-                    <a:bodyPr/>
-                    <a:lstStyle/>
-                    <a:p>
-                      <a:r>
-                        <a:rPr lang="en-US"/>
-                        <a:t>Platform</a:t>
-                      </a:r>
-                    </a:p>
-                  </a:txBody>
-                  <a:tcPr/>
-                </a:tc>
-                <a:tc>
-                  <a:txBody>
-                    <a:bodyPr/>
-                    <a:lstStyle/>
-                    <a:p>
-                      <a:r>
-                        <a:rPr lang="en-US"/>
-                        <a:t>modality</a:t>
-                      </a:r>
-                    </a:p>
-                  </a:txBody>
-                  <a:tcPr/>
-                </a:tc>
-                <a:tc>
-                  <a:txBody>
-                    <a:bodyPr/>
-                    <a:lstStyle/>
-                    <a:p>
-                      <a:r>
-                        <a:rPr lang="en-US"/>
-                        <a:t>when</a:t>
-                      </a:r>
-                    </a:p>
-                  </a:txBody>
-                  <a:tcPr/>
-                </a:tc>
-                <a:tc>
-                  <a:txBody>
-                    <a:bodyPr/>
-                    <a:lstStyle/>
-                    <a:p>
-                      <a:r>
-                        <a:rPr lang="en-US"/>
-                        <a:t>answered</a:t>
-                      </a:r>
-                    </a:p>
-                  </a:txBody>
-                  <a:tcPr/>
-                </a:tc>
-                <a:tc>
-                  <a:txBody>
-                    <a:bodyPr/>
-                    <a:lstStyle/>
-                    <a:p>
-                      <a:r>
-                        <a:rPr lang="en-US"/>
-                        <a:t>visibility</a:t>
-                      </a:r>
-                    </a:p>
-                  </a:txBody>
-                  <a:tcPr/>
-                </a:tc>
-                <a:extLst>
-                  <a:ext uri="{0D108BD9-81ED-4DB2-BD59-A6C34878D82A}">
-                    <a16:rowId xmlns:a16="http://schemas.microsoft.com/office/drawing/2014/main" val="3403969237"/>
-                  </a:ext>
-                </a:extLst>
-              </a:tr>
-              <a:tr h="370840">
-                <a:tc>
-                  <a:txBody>
-                    <a:bodyPr/>
-                    <a:lstStyle/>
-                    <a:p>
-                      <a:r>
-                        <a:rPr lang="en-US"/>
-                        <a:t>Moodle</a:t>
-                      </a:r>
-                    </a:p>
-                  </a:txBody>
-                  <a:tcPr/>
-                </a:tc>
-                <a:tc>
-                  <a:txBody>
-                    <a:bodyPr/>
-                    <a:lstStyle/>
-                    <a:p>
-                      <a:r>
-                        <a:rPr lang="en-US"/>
-                        <a:t>offline</a:t>
-                      </a:r>
-                    </a:p>
-                  </a:txBody>
-                  <a:tcPr/>
-                </a:tc>
-                <a:tc>
-                  <a:txBody>
-                    <a:bodyPr/>
-                    <a:lstStyle/>
-                    <a:p>
-                      <a:r>
-                        <a:rPr lang="en-US"/>
-                        <a:t>After studying</a:t>
-                      </a:r>
-                    </a:p>
-                  </a:txBody>
-                  <a:tcPr/>
-                </a:tc>
-                <a:tc>
-                  <a:txBody>
-                    <a:bodyPr/>
-                    <a:lstStyle/>
-                    <a:p>
-                      <a:r>
-                        <a:rPr lang="en-US"/>
-                        <a:t>Tuesday session</a:t>
-                      </a:r>
-                    </a:p>
-                  </a:txBody>
-                  <a:tcPr/>
-                </a:tc>
-                <a:tc>
-                  <a:txBody>
-                    <a:bodyPr/>
-                    <a:lstStyle/>
-                    <a:p>
-                      <a:r>
-                        <a:rPr lang="en-US"/>
-                        <a:t>public</a:t>
-                      </a:r>
-                    </a:p>
-                  </a:txBody>
-                  <a:tcPr/>
-                </a:tc>
-                <a:extLst>
-                  <a:ext uri="{0D108BD9-81ED-4DB2-BD59-A6C34878D82A}">
-                    <a16:rowId xmlns:a16="http://schemas.microsoft.com/office/drawing/2014/main" val="3275686737"/>
-                  </a:ext>
-                </a:extLst>
-              </a:tr>
-              <a:tr h="370840">
-                <a:tc>
-                  <a:txBody>
-                    <a:bodyPr/>
-                    <a:lstStyle/>
-                    <a:p>
-                      <a:r>
-                        <a:rPr lang="en-US"/>
-                        <a:t>Zoom chat</a:t>
-                      </a:r>
-                    </a:p>
-                  </a:txBody>
-                  <a:tcPr/>
-                </a:tc>
-                <a:tc>
-                  <a:txBody>
-                    <a:bodyPr/>
-                    <a:lstStyle/>
-                    <a:p>
-                      <a:r>
-                        <a:rPr lang="en-US"/>
-                        <a:t>online</a:t>
-                      </a:r>
-                    </a:p>
-                  </a:txBody>
-                  <a:tcPr/>
-                </a:tc>
-                <a:tc>
-                  <a:txBody>
-                    <a:bodyPr/>
-                    <a:lstStyle/>
-                    <a:p>
-                      <a:r>
-                        <a:rPr lang="en-US"/>
-                        <a:t>During online class</a:t>
-                      </a:r>
-                    </a:p>
-                  </a:txBody>
-                  <a:tcPr/>
-                </a:tc>
-                <a:tc>
-                  <a:txBody>
-                    <a:bodyPr/>
-                    <a:lstStyle/>
-                    <a:p>
-                      <a:pPr marL="0" marR="0" lvl="0" indent="0" algn="l" defTabSz="914400" rtl="0" eaLnBrk="1" fontAlgn="auto" latinLnBrk="0" hangingPunct="1">
-                        <a:lnSpc>
-                          <a:spcPct val="100000"/>
-                        </a:lnSpc>
-                        <a:spcBef>
-                          <a:spcPts val="0"/>
-                        </a:spcBef>
-                        <a:spcAft>
-                          <a:spcPts val="0"/>
-                        </a:spcAft>
-                        <a:buClrTx/>
-                        <a:buSzTx/>
-                        <a:buFontTx/>
-                        <a:buNone/>
-                        <a:tabLst/>
-                        <a:defRPr/>
-                      </a:pPr>
-                      <a:r>
-                        <a:rPr lang="en-US"/>
-                        <a:t>Tuesday session</a:t>
-                      </a:r>
-                    </a:p>
-                    <a:p>
-                      <a:endParaRPr lang="en-US"/>
-                    </a:p>
-                  </a:txBody>
-                  <a:tcPr/>
-                </a:tc>
-                <a:tc>
-                  <a:txBody>
-                    <a:bodyPr/>
-                    <a:lstStyle/>
-                    <a:p>
-                      <a:r>
-                        <a:rPr lang="en-US"/>
-                        <a:t>public</a:t>
-                      </a:r>
-                    </a:p>
-                  </a:txBody>
-                  <a:tcPr/>
-                </a:tc>
-                <a:extLst>
-                  <a:ext uri="{0D108BD9-81ED-4DB2-BD59-A6C34878D82A}">
-                    <a16:rowId xmlns:a16="http://schemas.microsoft.com/office/drawing/2014/main" val="2251169270"/>
-                  </a:ext>
-                </a:extLst>
-              </a:tr>
-              <a:tr h="370840">
-                <a:tc>
-                  <a:txBody>
-                    <a:bodyPr/>
-                    <a:lstStyle/>
-                    <a:p>
-                      <a:r>
-                        <a:rPr lang="en-US"/>
-                        <a:t>Discord</a:t>
-                      </a:r>
-                    </a:p>
-                  </a:txBody>
-                  <a:tcPr/>
-                </a:tc>
-                <a:tc>
-                  <a:txBody>
-                    <a:bodyPr/>
-                    <a:lstStyle/>
-                    <a:p>
-                      <a:r>
-                        <a:rPr lang="en-US"/>
-                        <a:t>offline</a:t>
-                      </a:r>
-                    </a:p>
-                  </a:txBody>
-                  <a:tcPr/>
-                </a:tc>
-                <a:tc>
-                  <a:txBody>
-                    <a:bodyPr/>
-                    <a:lstStyle/>
-                    <a:p>
-                      <a:r>
-                        <a:rPr lang="en-US"/>
-                        <a:t>During the week</a:t>
-                      </a:r>
-                    </a:p>
-                  </a:txBody>
-                  <a:tcPr/>
-                </a:tc>
-                <a:tc>
-                  <a:txBody>
-                    <a:bodyPr/>
-                    <a:lstStyle/>
-                    <a:p>
-                      <a:r>
-                        <a:rPr lang="en-US"/>
-                        <a:t>Friday exercise</a:t>
-                      </a:r>
-                    </a:p>
-                  </a:txBody>
-                  <a:tcPr/>
-                </a:tc>
-                <a:tc>
-                  <a:txBody>
-                    <a:bodyPr/>
-                    <a:lstStyle/>
-                    <a:p>
-                      <a:r>
-                        <a:rPr lang="en-US"/>
-                        <a:t>Public or private</a:t>
-                      </a:r>
-                    </a:p>
-                  </a:txBody>
-                  <a:tcPr/>
-                </a:tc>
-                <a:extLst>
-                  <a:ext uri="{0D108BD9-81ED-4DB2-BD59-A6C34878D82A}">
-                    <a16:rowId xmlns:a16="http://schemas.microsoft.com/office/drawing/2014/main" val="2767651006"/>
-                  </a:ext>
-                </a:extLst>
-              </a:tr>
-              <a:tr h="370840">
-                <a:tc>
-                  <a:txBody>
-                    <a:bodyPr/>
-                    <a:lstStyle/>
-                    <a:p>
-                      <a:r>
-                        <a:rPr lang="en-US"/>
-                        <a:t>Discord</a:t>
-                      </a:r>
-                    </a:p>
-                  </a:txBody>
-                  <a:tcPr/>
-                </a:tc>
-                <a:tc>
-                  <a:txBody>
-                    <a:bodyPr/>
-                    <a:lstStyle/>
-                    <a:p>
-                      <a:r>
-                        <a:rPr lang="en-US"/>
-                        <a:t>online</a:t>
-                      </a:r>
-                    </a:p>
-                  </a:txBody>
-                  <a:tcPr/>
-                </a:tc>
-                <a:tc>
-                  <a:txBody>
-                    <a:bodyPr/>
-                    <a:lstStyle/>
-                    <a:p>
-                      <a:r>
-                        <a:rPr lang="en-US"/>
-                        <a:t>During Friday exercise</a:t>
-                      </a:r>
-                    </a:p>
-                  </a:txBody>
-                  <a:tcPr/>
-                </a:tc>
-                <a:tc>
-                  <a:txBody>
-                    <a:bodyPr/>
-                    <a:lstStyle/>
-                    <a:p>
-                      <a:pPr marL="0" marR="0" lvl="0" indent="0" algn="l" defTabSz="914400" rtl="0" eaLnBrk="1" fontAlgn="auto" latinLnBrk="0" hangingPunct="1">
-                        <a:lnSpc>
-                          <a:spcPct val="100000"/>
-                        </a:lnSpc>
-                        <a:spcBef>
-                          <a:spcPts val="0"/>
-                        </a:spcBef>
-                        <a:spcAft>
-                          <a:spcPts val="0"/>
-                        </a:spcAft>
-                        <a:buClrTx/>
-                        <a:buSzTx/>
-                        <a:buFontTx/>
-                        <a:buNone/>
-                        <a:tabLst/>
-                        <a:defRPr/>
-                      </a:pPr>
-                      <a:r>
-                        <a:rPr lang="en-US"/>
-                        <a:t>Friday exercise</a:t>
-                      </a:r>
-                    </a:p>
-                    <a:p>
-                      <a:endParaRPr lang="en-US"/>
-                    </a:p>
-                  </a:txBody>
-                  <a:tcPr/>
-                </a:tc>
-                <a:tc>
-                  <a:txBody>
-                    <a:bodyPr/>
-                    <a:lstStyle/>
-                    <a:p>
-                      <a:pPr marL="0" marR="0" lvl="0" indent="0" algn="l" defTabSz="914400" rtl="0" eaLnBrk="1" fontAlgn="auto" latinLnBrk="0" hangingPunct="1">
-                        <a:lnSpc>
-                          <a:spcPct val="100000"/>
-                        </a:lnSpc>
-                        <a:spcBef>
-                          <a:spcPts val="0"/>
-                        </a:spcBef>
-                        <a:spcAft>
-                          <a:spcPts val="0"/>
-                        </a:spcAft>
-                        <a:buClrTx/>
-                        <a:buSzTx/>
-                        <a:buFontTx/>
-                        <a:buNone/>
-                        <a:tabLst/>
-                        <a:defRPr/>
-                      </a:pPr>
-                      <a:r>
-                        <a:rPr lang="en-US"/>
-                        <a:t>Public or private</a:t>
-                      </a:r>
-                    </a:p>
-                    <a:p>
-                      <a:endParaRPr lang="en-US"/>
-                    </a:p>
-                  </a:txBody>
-                  <a:tcPr/>
-                </a:tc>
-                <a:extLst>
-                  <a:ext uri="{0D108BD9-81ED-4DB2-BD59-A6C34878D82A}">
-                    <a16:rowId xmlns:a16="http://schemas.microsoft.com/office/drawing/2014/main" val="2142359889"/>
-                  </a:ext>
-                </a:extLst>
-              </a:tr>
-            </a:tbl>
-          </a:graphicData>
-        </a:graphic>
-      </p:graphicFrame>
     </p:spTree>
     <p:extLst>
       <p:ext uri="{BB962C8B-B14F-4D97-AF65-F5344CB8AC3E}">
-        <p14:creationId xmlns:p14="http://schemas.microsoft.com/office/powerpoint/2010/main" val="724816618"/>
+        <p14:creationId xmlns:p14="http://schemas.microsoft.com/office/powerpoint/2010/main" val="4183796943"/>
       </p:ext>
     </p:extLst>
   </p:cSld>

</xml_diff>